<commit_message>
apresentação sobre relação de tabela atualizada - exer banco de dados
</commit_message>
<xml_diff>
--- a/SQL_aula1.pptx
+++ b/SQL_aula1.pptx
@@ -5,7 +5,7 @@
     <p:sldMasterId id="2147483714" r:id="rId4"/>
   </p:sldMasterIdLst>
   <p:notesMasterIdLst>
-    <p:notesMasterId r:id="rId20"/>
+    <p:notesMasterId r:id="rId26"/>
   </p:notesMasterIdLst>
   <p:sldIdLst>
     <p:sldId id="261" r:id="rId5"/>
@@ -22,7 +22,13 @@
     <p:sldId id="277" r:id="rId16"/>
     <p:sldId id="278" r:id="rId17"/>
     <p:sldId id="279" r:id="rId18"/>
-    <p:sldId id="270" r:id="rId19"/>
+    <p:sldId id="280" r:id="rId19"/>
+    <p:sldId id="281" r:id="rId20"/>
+    <p:sldId id="282" r:id="rId21"/>
+    <p:sldId id="283" r:id="rId22"/>
+    <p:sldId id="284" r:id="rId23"/>
+    <p:sldId id="285" r:id="rId24"/>
+    <p:sldId id="270" r:id="rId25"/>
   </p:sldIdLst>
   <p:sldSz cx="12192000" cy="6858000"/>
   <p:notesSz cx="6858000" cy="9144000"/>
@@ -121,6 +127,11 @@
       </a:defRPr>
     </a:lvl9pPr>
   </p:defaultTextStyle>
+  <p:extLst>
+    <p:ext uri="{EFAFB233-063F-42B5-8137-9DF3F51BA10A}">
+      <p15:sldGuideLst xmlns:p15="http://schemas.microsoft.com/office/powerpoint/2012/main"/>
+    </p:ext>
+  </p:extLst>
 </p:presentation>
 </file>
 
@@ -8381,7 +8392,6 @@
               <a:rPr lang="pt-BR" sz="2400" dirty="0"/>
               <a:t>(53) mantém um campo de 8 bytes.</a:t>
             </a:r>
-            <a:endParaRPr lang="pt-BR" sz="2400" dirty="0"/>
           </a:p>
         </p:txBody>
       </p:sp>
@@ -8761,11 +8771,7 @@
           <a:p>
             <a:r>
               <a:rPr lang="pt-BR" sz="2400" dirty="0"/>
-              <a:t>Real: </a:t>
-            </a:r>
-            <a:r>
-              <a:rPr lang="pt-BR" sz="2400" dirty="0"/>
-              <a:t>T</a:t>
+              <a:t>Real: T</a:t>
             </a:r>
             <a:r>
               <a:rPr lang="pt-BR" sz="2400" dirty="0" smtClean="0"/>
@@ -8775,7 +8781,6 @@
               <a:rPr lang="pt-BR" sz="2400" dirty="0"/>
               <a:t>sete dígitos de precisão (precisão única) e é mapeado diretamente para o tipo SQL Server real.</a:t>
             </a:r>
-            <a:endParaRPr lang="pt-BR" sz="2400" dirty="0"/>
           </a:p>
         </p:txBody>
       </p:sp>
@@ -9189,7 +9194,6 @@
               <a:rPr lang="pt-BR" sz="2400" dirty="0"/>
               <a:t>.</a:t>
             </a:r>
-            <a:endParaRPr lang="pt-BR" sz="2400" dirty="0"/>
           </a:p>
         </p:txBody>
       </p:sp>
@@ -9581,7 +9585,6 @@
               <a:rPr lang="pt-BR" dirty="0"/>
               <a:t> - Linguagem de Manipulação de Dados. São os comandos que interagem com os dados dentro das tabelas.</a:t>
             </a:r>
-            <a:endParaRPr lang="pt-BR" dirty="0"/>
           </a:p>
         </p:txBody>
       </p:sp>
@@ -9877,8 +9880,8 @@
         </p:nvSpPr>
         <p:spPr>
           <a:xfrm>
-            <a:off x="2498501" y="741514"/>
-            <a:ext cx="8384145" cy="4029130"/>
+            <a:off x="1387632" y="689998"/>
+            <a:ext cx="8606373" cy="997134"/>
           </a:xfrm>
         </p:spPr>
         <p:txBody>
@@ -9886,10 +9889,14 @@
           <a:lstStyle/>
           <a:p>
             <a:r>
-              <a:rPr lang="pt-BR" sz="9600" b="1" dirty="0" smtClean="0"/>
-              <a:t>OBRIGADO</a:t>
-            </a:r>
-            <a:endParaRPr lang="pt-BR" sz="9600" b="1" dirty="0"/>
+              <a:rPr lang="pt-BR" sz="4400" b="1" dirty="0" err="1"/>
+              <a:t>Primary</a:t>
+            </a:r>
+            <a:r>
+              <a:rPr lang="pt-BR" sz="4400" b="1" dirty="0"/>
+              <a:t> Key (Chave Primária)</a:t>
+            </a:r>
+            <a:endParaRPr lang="pt-BR" sz="4400" b="1" dirty="0"/>
           </a:p>
         </p:txBody>
       </p:sp>
@@ -9905,21 +9912,31 @@
         </p:nvSpPr>
         <p:spPr>
           <a:xfrm>
-            <a:off x="8487177" y="2756079"/>
-            <a:ext cx="2550017" cy="3492320"/>
+            <a:off x="1043190" y="3657600"/>
+            <a:ext cx="9440213" cy="2474622"/>
           </a:xfrm>
         </p:spPr>
         <p:txBody>
-          <a:bodyPr/>
+          <a:bodyPr>
+            <a:noAutofit/>
+          </a:bodyPr>
           <a:lstStyle/>
           <a:p>
+            <a:r>
+              <a:rPr lang="pt-BR" dirty="0" err="1"/>
+              <a:t>Primary</a:t>
+            </a:r>
+            <a:r>
+              <a:rPr lang="pt-BR" dirty="0"/>
+              <a:t> Key (Chave Primária): Uma chave primária é utilizada da identificar de forma única cada linha numa tabela. Pode fazer parte do próprio registo atual ou pode ser um campo artificial (um que não tenha nada que ver com o registo atual). Uma chave primária pode ser composta por um ou mais campos numa tabela. Quando são utilizados vários campos como chave primária, são denominados por chave composta.</a:t>
+            </a:r>
             <a:endParaRPr lang="pt-BR" dirty="0"/>
           </a:p>
         </p:txBody>
       </p:sp>
       <p:pic>
         <p:nvPicPr>
-          <p:cNvPr id="4" name="Imagem 3"/>
+          <p:cNvPr id="6" name="Imagem 5"/>
           <p:cNvPicPr>
             <a:picLocks noChangeAspect="1"/>
           </p:cNvPicPr>
@@ -9933,8 +9950,65 @@
         </p:blipFill>
         <p:spPr>
           <a:xfrm>
-            <a:off x="3515935" y="2252614"/>
-            <a:ext cx="4520484" cy="3995785"/>
+            <a:off x="6207918" y="1616953"/>
+            <a:ext cx="5166388" cy="1576838"/>
+          </a:xfrm>
+          <a:prstGeom prst="rect">
+            <a:avLst/>
+          </a:prstGeom>
+        </p:spPr>
+      </p:pic>
+      <p:cxnSp>
+        <p:nvCxnSpPr>
+          <p:cNvPr id="8" name="Conector de seta reta 7"/>
+          <p:cNvCxnSpPr/>
+          <p:nvPr/>
+        </p:nvCxnSpPr>
+        <p:spPr>
+          <a:xfrm>
+            <a:off x="5542309" y="2109789"/>
+            <a:ext cx="665609" cy="220448"/>
+          </a:xfrm>
+          <a:prstGeom prst="straightConnector1">
+            <a:avLst/>
+          </a:prstGeom>
+          <a:ln w="76200">
+            <a:tailEnd type="triangle"/>
+          </a:ln>
+        </p:spPr>
+        <p:style>
+          <a:lnRef idx="1">
+            <a:schemeClr val="dk1"/>
+          </a:lnRef>
+          <a:fillRef idx="0">
+            <a:schemeClr val="dk1"/>
+          </a:fillRef>
+          <a:effectRef idx="0">
+            <a:schemeClr val="dk1"/>
+          </a:effectRef>
+          <a:fontRef idx="minor">
+            <a:schemeClr val="tx1"/>
+          </a:fontRef>
+        </p:style>
+      </p:cxnSp>
+      <p:pic>
+        <p:nvPicPr>
+          <p:cNvPr id="10" name="Imagem 9"/>
+          <p:cNvPicPr>
+            <a:picLocks noChangeAspect="1"/>
+          </p:cNvPicPr>
+          <p:nvPr/>
+        </p:nvPicPr>
+        <p:blipFill>
+          <a:blip r:embed="rId3"/>
+          <a:stretch>
+            <a:fillRect/>
+          </a:stretch>
+        </p:blipFill>
+        <p:spPr>
+          <a:xfrm>
+            <a:off x="1387632" y="1616953"/>
+            <a:ext cx="4047253" cy="1778137"/>
           </a:xfrm>
           <a:prstGeom prst="rect">
             <a:avLst/>
@@ -9944,7 +10018,7 @@
     </p:spTree>
     <p:extLst>
       <p:ext uri="{BB962C8B-B14F-4D97-AF65-F5344CB8AC3E}">
-        <p14:creationId xmlns:p14="http://schemas.microsoft.com/office/powerpoint/2010/main" val="2816668587"/>
+        <p14:creationId xmlns:p14="http://schemas.microsoft.com/office/powerpoint/2010/main" val="1313576111"/>
       </p:ext>
     </p:extLst>
   </p:cSld>
@@ -9972,7 +10046,7 @@
                             </p:stCondLst>
                             <p:childTnLst>
                               <p:par>
-                                <p:cTn id="5" presetID="26" presetClass="entr" presetSubtype="0" fill="hold" grpId="0" nodeType="clickEffect">
+                                <p:cTn id="5" presetID="10" presetClass="entr" presetSubtype="0" fill="hold" grpId="0" nodeType="clickEffect">
                                   <p:stCondLst>
                                     <p:cond delay="0"/>
                                   </p:stCondLst>
@@ -9995,274 +10069,1106 @@
                                         <p:strVal val="visible"/>
                                       </p:to>
                                     </p:set>
-                                    <p:animEffect transition="in" filter="wipe(down)">
-                                      <p:cBhvr>
-                                        <p:cTn id="7" dur="580">
+                                    <p:animEffect transition="in" filter="fade">
+                                      <p:cBhvr>
+                                        <p:cTn id="7" dur="500"/>
+                                        <p:tgtEl>
+                                          <p:spTgt spid="2"/>
+                                        </p:tgtEl>
+                                      </p:cBhvr>
+                                    </p:animEffect>
+                                  </p:childTnLst>
+                                </p:cTn>
+                              </p:par>
+                              <p:par>
+                                <p:cTn id="8" presetID="10" presetClass="entr" presetSubtype="0" fill="hold" grpId="0" nodeType="withEffect">
+                                  <p:stCondLst>
+                                    <p:cond delay="0"/>
+                                  </p:stCondLst>
+                                  <p:childTnLst>
+                                    <p:set>
+                                      <p:cBhvr>
+                                        <p:cTn id="9" dur="1" fill="hold">
                                           <p:stCondLst>
                                             <p:cond delay="0"/>
                                           </p:stCondLst>
                                         </p:cTn>
                                         <p:tgtEl>
-                                          <p:spTgt spid="2"/>
+                                          <p:spTgt spid="3">
+                                            <p:txEl>
+                                              <p:pRg st="0" end="0"/>
+                                            </p:txEl>
+                                          </p:spTgt>
+                                        </p:tgtEl>
+                                        <p:attrNameLst>
+                                          <p:attrName>style.visibility</p:attrName>
+                                        </p:attrNameLst>
+                                      </p:cBhvr>
+                                      <p:to>
+                                        <p:strVal val="visible"/>
+                                      </p:to>
+                                    </p:set>
+                                    <p:animEffect transition="in" filter="fade">
+                                      <p:cBhvr>
+                                        <p:cTn id="10" dur="500"/>
+                                        <p:tgtEl>
+                                          <p:spTgt spid="3">
+                                            <p:txEl>
+                                              <p:pRg st="0" end="0"/>
+                                            </p:txEl>
+                                          </p:spTgt>
                                         </p:tgtEl>
                                       </p:cBhvr>
                                     </p:animEffect>
-                                    <p:anim calcmode="lin" valueType="num">
-                                      <p:cBhvr>
-                                        <p:cTn id="8" dur="1822" tmFilter="0,0; 0.14,0.36; 0.43,0.73; 0.71,0.91; 1.0,1.0">
+                                  </p:childTnLst>
+                                </p:cTn>
+                              </p:par>
+                              <p:par>
+                                <p:cTn id="11" presetID="10" presetClass="entr" presetSubtype="0" fill="hold" nodeType="withEffect">
+                                  <p:stCondLst>
+                                    <p:cond delay="0"/>
+                                  </p:stCondLst>
+                                  <p:childTnLst>
+                                    <p:set>
+                                      <p:cBhvr>
+                                        <p:cTn id="12" dur="1" fill="hold">
                                           <p:stCondLst>
                                             <p:cond delay="0"/>
                                           </p:stCondLst>
                                         </p:cTn>
                                         <p:tgtEl>
-                                          <p:spTgt spid="2"/>
+                                          <p:spTgt spid="6"/>
                                         </p:tgtEl>
                                         <p:attrNameLst>
-                                          <p:attrName>ppt_x</p:attrName>
+                                          <p:attrName>style.visibility</p:attrName>
                                         </p:attrNameLst>
                                       </p:cBhvr>
-                                      <p:tavLst>
-                                        <p:tav tm="0">
-                                          <p:val>
-                                            <p:strVal val="#ppt_x-0.25"/>
-                                          </p:val>
-                                        </p:tav>
-                                        <p:tav tm="100000">
-                                          <p:val>
-                                            <p:strVal val="#ppt_x"/>
-                                          </p:val>
-                                        </p:tav>
-                                      </p:tavLst>
-                                    </p:anim>
-                                    <p:anim calcmode="lin" valueType="num">
-                                      <p:cBhvr>
-                                        <p:cTn id="9" dur="664" tmFilter="0.0,0.0; 0.25,0.07; 0.50,0.2; 0.75,0.467; 1.0,1.0">
+                                      <p:to>
+                                        <p:strVal val="visible"/>
+                                      </p:to>
+                                    </p:set>
+                                    <p:animEffect transition="in" filter="fade">
+                                      <p:cBhvr>
+                                        <p:cTn id="13" dur="500"/>
+                                        <p:tgtEl>
+                                          <p:spTgt spid="6"/>
+                                        </p:tgtEl>
+                                      </p:cBhvr>
+                                    </p:animEffect>
+                                  </p:childTnLst>
+                                </p:cTn>
+                              </p:par>
+                              <p:par>
+                                <p:cTn id="14" presetID="10" presetClass="entr" presetSubtype="0" fill="hold" nodeType="withEffect">
+                                  <p:stCondLst>
+                                    <p:cond delay="0"/>
+                                  </p:stCondLst>
+                                  <p:childTnLst>
+                                    <p:set>
+                                      <p:cBhvr>
+                                        <p:cTn id="15" dur="1" fill="hold">
                                           <p:stCondLst>
                                             <p:cond delay="0"/>
                                           </p:stCondLst>
                                         </p:cTn>
                                         <p:tgtEl>
-                                          <p:spTgt spid="2"/>
+                                          <p:spTgt spid="8"/>
                                         </p:tgtEl>
                                         <p:attrNameLst>
-                                          <p:attrName>ppt_y</p:attrName>
+                                          <p:attrName>style.visibility</p:attrName>
                                         </p:attrNameLst>
                                       </p:cBhvr>
-                                      <p:tavLst>
-                                        <p:tav tm="0" fmla="#ppt_y-sin(pi*$)/3">
-                                          <p:val>
-                                            <p:fltVal val="0.5"/>
-                                          </p:val>
-                                        </p:tav>
-                                        <p:tav tm="100000">
-                                          <p:val>
-                                            <p:fltVal val="1"/>
-                                          </p:val>
-                                        </p:tav>
-                                      </p:tavLst>
-                                    </p:anim>
-                                    <p:anim calcmode="lin" valueType="num">
-                                      <p:cBhvr>
-                                        <p:cTn id="10" dur="664" tmFilter="0, 0; 0.125,0.2665; 0.25,0.4; 0.375,0.465; 0.5,0.5;  0.625,0.535; 0.75,0.6; 0.875,0.7335; 1,1">
+                                      <p:to>
+                                        <p:strVal val="visible"/>
+                                      </p:to>
+                                    </p:set>
+                                    <p:animEffect transition="in" filter="fade">
+                                      <p:cBhvr>
+                                        <p:cTn id="16" dur="500"/>
+                                        <p:tgtEl>
+                                          <p:spTgt spid="8"/>
+                                        </p:tgtEl>
+                                      </p:cBhvr>
+                                    </p:animEffect>
+                                  </p:childTnLst>
+                                </p:cTn>
+                              </p:par>
+                            </p:childTnLst>
+                          </p:cTn>
+                        </p:par>
+                      </p:childTnLst>
+                    </p:cTn>
+                  </p:par>
+                </p:childTnLst>
+              </p:cTn>
+              <p:prevCondLst>
+                <p:cond evt="onPrev" delay="0">
+                  <p:tgtEl>
+                    <p:sldTgt/>
+                  </p:tgtEl>
+                </p:cond>
+              </p:prevCondLst>
+              <p:nextCondLst>
+                <p:cond evt="onNext" delay="0">
+                  <p:tgtEl>
+                    <p:sldTgt/>
+                  </p:tgtEl>
+                </p:cond>
+              </p:nextCondLst>
+            </p:seq>
+          </p:childTnLst>
+        </p:cTn>
+      </p:par>
+    </p:tnLst>
+    <p:bldLst>
+      <p:bldP spid="2" grpId="0"/>
+      <p:bldP spid="3" grpId="0" build="p"/>
+    </p:bldLst>
+  </p:timing>
+</p:sld>
+</file>
+
+<file path=ppt/slides/slide16.xml><?xml version="1.0" encoding="utf-8"?>
+<p:sld xmlns:a="http://schemas.openxmlformats.org/drawingml/2006/main" xmlns:r="http://schemas.openxmlformats.org/officeDocument/2006/relationships" xmlns:p="http://schemas.openxmlformats.org/presentationml/2006/main">
+  <p:cSld>
+    <p:spTree>
+      <p:nvGrpSpPr>
+        <p:cNvPr id="1" name=""/>
+        <p:cNvGrpSpPr/>
+        <p:nvPr/>
+      </p:nvGrpSpPr>
+      <p:grpSpPr>
+        <a:xfrm>
+          <a:off x="0" y="0"/>
+          <a:ext cx="0" cy="0"/>
+          <a:chOff x="0" y="0"/>
+          <a:chExt cx="0" cy="0"/>
+        </a:xfrm>
+      </p:grpSpPr>
+      <p:sp>
+        <p:nvSpPr>
+          <p:cNvPr id="2" name="Título 1"/>
+          <p:cNvSpPr>
+            <a:spLocks noGrp="1"/>
+          </p:cNvSpPr>
+          <p:nvPr>
+            <p:ph type="title"/>
+          </p:nvPr>
+        </p:nvSpPr>
+        <p:spPr>
+          <a:xfrm>
+            <a:off x="4546243" y="793029"/>
+            <a:ext cx="2240923" cy="997134"/>
+          </a:xfrm>
+        </p:spPr>
+        <p:txBody>
+          <a:bodyPr/>
+          <a:lstStyle/>
+          <a:p>
+            <a:r>
+              <a:rPr lang="pt-BR" sz="4400" b="1" dirty="0" err="1" smtClean="0"/>
+              <a:t>Identity</a:t>
+            </a:r>
+            <a:endParaRPr lang="pt-BR" sz="4400" b="1" dirty="0"/>
+          </a:p>
+        </p:txBody>
+      </p:sp>
+      <p:sp>
+        <p:nvSpPr>
+          <p:cNvPr id="3" name="Espaço Reservado para Conteúdo 2"/>
+          <p:cNvSpPr>
+            <a:spLocks noGrp="1"/>
+          </p:cNvSpPr>
+          <p:nvPr>
+            <p:ph idx="1"/>
+          </p:nvPr>
+        </p:nvSpPr>
+        <p:spPr>
+          <a:xfrm>
+            <a:off x="1309833" y="2091878"/>
+            <a:ext cx="4237148" cy="3981450"/>
+          </a:xfrm>
+        </p:spPr>
+        <p:txBody>
+          <a:bodyPr>
+            <a:noAutofit/>
+          </a:bodyPr>
+          <a:lstStyle/>
+          <a:p>
+            <a:r>
+              <a:rPr lang="pt-BR" dirty="0" err="1"/>
+              <a:t>Identity</a:t>
+            </a:r>
+            <a:r>
+              <a:rPr lang="pt-BR" dirty="0"/>
+              <a:t>: A propriedade IDENTITY é utilizada para atributos (campos/colunas) das tabelas nas funções CREATE TABLE e ALTER TABLE, e tem como finalidade incrementar um valor a cada nova inserção.</a:t>
+            </a:r>
+            <a:endParaRPr lang="pt-BR" dirty="0"/>
+          </a:p>
+        </p:txBody>
+      </p:sp>
+      <p:pic>
+        <p:nvPicPr>
+          <p:cNvPr id="4" name="Imagem 3"/>
+          <p:cNvPicPr>
+            <a:picLocks noChangeAspect="1"/>
+          </p:cNvPicPr>
+          <p:nvPr/>
+        </p:nvPicPr>
+        <p:blipFill>
+          <a:blip r:embed="rId2"/>
+          <a:stretch>
+            <a:fillRect/>
+          </a:stretch>
+        </p:blipFill>
+        <p:spPr>
+          <a:xfrm>
+            <a:off x="6652749" y="1918952"/>
+            <a:ext cx="3443557" cy="2163651"/>
+          </a:xfrm>
+          <a:prstGeom prst="rect">
+            <a:avLst/>
+          </a:prstGeom>
+        </p:spPr>
+      </p:pic>
+      <p:pic>
+        <p:nvPicPr>
+          <p:cNvPr id="6" name="Imagem 5"/>
+          <p:cNvPicPr>
+            <a:picLocks noChangeAspect="1"/>
+          </p:cNvPicPr>
+          <p:nvPr/>
+        </p:nvPicPr>
+        <p:blipFill>
+          <a:blip r:embed="rId3"/>
+          <a:stretch>
+            <a:fillRect/>
+          </a:stretch>
+        </p:blipFill>
+        <p:spPr>
+          <a:xfrm>
+            <a:off x="1505535" y="4911478"/>
+            <a:ext cx="4296397" cy="755226"/>
+          </a:xfrm>
+          <a:prstGeom prst="rect">
+            <a:avLst/>
+          </a:prstGeom>
+        </p:spPr>
+      </p:pic>
+      <p:pic>
+        <p:nvPicPr>
+          <p:cNvPr id="7" name="Imagem 6"/>
+          <p:cNvPicPr>
+            <a:picLocks noChangeAspect="1"/>
+          </p:cNvPicPr>
+          <p:nvPr/>
+        </p:nvPicPr>
+        <p:blipFill>
+          <a:blip r:embed="rId4"/>
+          <a:stretch>
+            <a:fillRect/>
+          </a:stretch>
+        </p:blipFill>
+        <p:spPr>
+          <a:xfrm>
+            <a:off x="7057622" y="4211392"/>
+            <a:ext cx="3038684" cy="1717517"/>
+          </a:xfrm>
+          <a:prstGeom prst="rect">
+            <a:avLst/>
+          </a:prstGeom>
+        </p:spPr>
+      </p:pic>
+      <p:cxnSp>
+        <p:nvCxnSpPr>
+          <p:cNvPr id="11" name="Conector de seta reta 10"/>
+          <p:cNvCxnSpPr/>
+          <p:nvPr/>
+        </p:nvCxnSpPr>
+        <p:spPr>
+          <a:xfrm flipV="1">
+            <a:off x="5692462" y="2653048"/>
+            <a:ext cx="1094704" cy="2112135"/>
+          </a:xfrm>
+          <a:prstGeom prst="straightConnector1">
+            <a:avLst/>
+          </a:prstGeom>
+          <a:ln w="76200">
+            <a:tailEnd type="triangle"/>
+          </a:ln>
+        </p:spPr>
+        <p:style>
+          <a:lnRef idx="1">
+            <a:schemeClr val="dk1"/>
+          </a:lnRef>
+          <a:fillRef idx="0">
+            <a:schemeClr val="dk1"/>
+          </a:fillRef>
+          <a:effectRef idx="0">
+            <a:schemeClr val="dk1"/>
+          </a:effectRef>
+          <a:fontRef idx="minor">
+            <a:schemeClr val="tx1"/>
+          </a:fontRef>
+        </p:style>
+      </p:cxnSp>
+    </p:spTree>
+    <p:extLst>
+      <p:ext uri="{BB962C8B-B14F-4D97-AF65-F5344CB8AC3E}">
+        <p14:creationId xmlns:p14="http://schemas.microsoft.com/office/powerpoint/2010/main" val="1486821644"/>
+      </p:ext>
+    </p:extLst>
+  </p:cSld>
+  <p:clrMapOvr>
+    <a:masterClrMapping/>
+  </p:clrMapOvr>
+  <p:timing>
+    <p:tnLst>
+      <p:par>
+        <p:cTn id="1" dur="indefinite" restart="never" nodeType="tmRoot">
+          <p:childTnLst>
+            <p:seq concurrent="1" nextAc="seek">
+              <p:cTn id="2" dur="indefinite" nodeType="mainSeq">
+                <p:childTnLst>
+                  <p:par>
+                    <p:cTn id="3" fill="hold">
+                      <p:stCondLst>
+                        <p:cond delay="indefinite"/>
+                      </p:stCondLst>
+                      <p:childTnLst>
+                        <p:par>
+                          <p:cTn id="4" fill="hold">
+                            <p:stCondLst>
+                              <p:cond delay="0"/>
+                            </p:stCondLst>
+                            <p:childTnLst>
+                              <p:par>
+                                <p:cTn id="5" presetID="10" presetClass="entr" presetSubtype="0" fill="hold" grpId="0" nodeType="clickEffect">
+                                  <p:stCondLst>
+                                    <p:cond delay="0"/>
+                                  </p:stCondLst>
+                                  <p:childTnLst>
+                                    <p:set>
+                                      <p:cBhvr>
+                                        <p:cTn id="6" dur="1" fill="hold">
                                           <p:stCondLst>
-                                            <p:cond delay="664"/>
+                                            <p:cond delay="0"/>
                                           </p:stCondLst>
                                         </p:cTn>
                                         <p:tgtEl>
                                           <p:spTgt spid="2"/>
                                         </p:tgtEl>
                                         <p:attrNameLst>
-                                          <p:attrName>ppt_y</p:attrName>
+                                          <p:attrName>style.visibility</p:attrName>
                                         </p:attrNameLst>
                                       </p:cBhvr>
-                                      <p:tavLst>
-                                        <p:tav tm="0" fmla="#ppt_y-sin(pi*$)/9">
-                                          <p:val>
-                                            <p:fltVal val="0"/>
-                                          </p:val>
-                                        </p:tav>
-                                        <p:tav tm="100000">
-                                          <p:val>
-                                            <p:fltVal val="1"/>
-                                          </p:val>
-                                        </p:tav>
-                                      </p:tavLst>
-                                    </p:anim>
-                                    <p:anim calcmode="lin" valueType="num">
-                                      <p:cBhvr>
-                                        <p:cTn id="11" dur="332" tmFilter="0, 0; 0.125,0.2665; 0.25,0.4; 0.375,0.465; 0.5,0.5;  0.625,0.535; 0.75,0.6; 0.875,0.7335; 1,1">
-                                          <p:stCondLst>
-                                            <p:cond delay="1324"/>
-                                          </p:stCondLst>
-                                        </p:cTn>
+                                      <p:to>
+                                        <p:strVal val="visible"/>
+                                      </p:to>
+                                    </p:set>
+                                    <p:animEffect transition="in" filter="fade">
+                                      <p:cBhvr>
+                                        <p:cTn id="7" dur="500"/>
                                         <p:tgtEl>
                                           <p:spTgt spid="2"/>
                                         </p:tgtEl>
-                                        <p:attrNameLst>
-                                          <p:attrName>ppt_y</p:attrName>
-                                        </p:attrNameLst>
-                                      </p:cBhvr>
-                                      <p:tavLst>
-                                        <p:tav tm="0" fmla="#ppt_y-sin(pi*$)/27">
-                                          <p:val>
-                                            <p:fltVal val="0"/>
-                                          </p:val>
-                                        </p:tav>
-                                        <p:tav tm="100000">
-                                          <p:val>
-                                            <p:fltVal val="1"/>
-                                          </p:val>
-                                        </p:tav>
-                                      </p:tavLst>
-                                    </p:anim>
-                                    <p:anim calcmode="lin" valueType="num">
-                                      <p:cBhvr>
-                                        <p:cTn id="12" dur="164" tmFilter="0, 0; 0.125,0.2665; 0.25,0.4; 0.375,0.465; 0.5,0.5;  0.625,0.535; 0.75,0.6; 0.875,0.7335; 1,1">
-                                          <p:stCondLst>
-                                            <p:cond delay="1656"/>
-                                          </p:stCondLst>
-                                        </p:cTn>
-                                        <p:tgtEl>
-                                          <p:spTgt spid="2"/>
-                                        </p:tgtEl>
-                                        <p:attrNameLst>
-                                          <p:attrName>ppt_y</p:attrName>
-                                        </p:attrNameLst>
-                                      </p:cBhvr>
-                                      <p:tavLst>
-                                        <p:tav tm="0" fmla="#ppt_y-sin(pi*$)/81">
-                                          <p:val>
-                                            <p:fltVal val="0"/>
-                                          </p:val>
-                                        </p:tav>
-                                        <p:tav tm="100000">
-                                          <p:val>
-                                            <p:fltVal val="1"/>
-                                          </p:val>
-                                        </p:tav>
-                                      </p:tavLst>
-                                    </p:anim>
-                                    <p:animScale>
-                                      <p:cBhvr>
-                                        <p:cTn id="13" dur="26">
-                                          <p:stCondLst>
-                                            <p:cond delay="650"/>
-                                          </p:stCondLst>
-                                        </p:cTn>
-                                        <p:tgtEl>
-                                          <p:spTgt spid="2"/>
-                                        </p:tgtEl>
-                                      </p:cBhvr>
-                                      <p:to x="100000" y="60000"/>
-                                    </p:animScale>
-                                    <p:animScale>
-                                      <p:cBhvr>
-                                        <p:cTn id="14" dur="166" decel="50000">
-                                          <p:stCondLst>
-                                            <p:cond delay="676"/>
-                                          </p:stCondLst>
-                                        </p:cTn>
-                                        <p:tgtEl>
-                                          <p:spTgt spid="2"/>
-                                        </p:tgtEl>
-                                      </p:cBhvr>
-                                      <p:to x="100000" y="100000"/>
-                                    </p:animScale>
-                                    <p:animScale>
-                                      <p:cBhvr>
-                                        <p:cTn id="15" dur="26">
-                                          <p:stCondLst>
-                                            <p:cond delay="1312"/>
-                                          </p:stCondLst>
-                                        </p:cTn>
-                                        <p:tgtEl>
-                                          <p:spTgt spid="2"/>
-                                        </p:tgtEl>
-                                      </p:cBhvr>
-                                      <p:to x="100000" y="80000"/>
-                                    </p:animScale>
-                                    <p:animScale>
-                                      <p:cBhvr>
-                                        <p:cTn id="16" dur="166" decel="50000">
-                                          <p:stCondLst>
-                                            <p:cond delay="1338"/>
-                                          </p:stCondLst>
-                                        </p:cTn>
-                                        <p:tgtEl>
-                                          <p:spTgt spid="2"/>
-                                        </p:tgtEl>
-                                      </p:cBhvr>
-                                      <p:to x="100000" y="100000"/>
-                                    </p:animScale>
-                                    <p:animScale>
-                                      <p:cBhvr>
-                                        <p:cTn id="17" dur="26">
-                                          <p:stCondLst>
-                                            <p:cond delay="1642"/>
-                                          </p:stCondLst>
-                                        </p:cTn>
-                                        <p:tgtEl>
-                                          <p:spTgt spid="2"/>
-                                        </p:tgtEl>
-                                      </p:cBhvr>
-                                      <p:to x="100000" y="90000"/>
-                                    </p:animScale>
-                                    <p:animScale>
-                                      <p:cBhvr>
-                                        <p:cTn id="18" dur="166" decel="50000">
-                                          <p:stCondLst>
-                                            <p:cond delay="1668"/>
-                                          </p:stCondLst>
-                                        </p:cTn>
-                                        <p:tgtEl>
-                                          <p:spTgt spid="2"/>
-                                        </p:tgtEl>
-                                      </p:cBhvr>
-                                      <p:to x="100000" y="100000"/>
-                                    </p:animScale>
-                                    <p:animScale>
-                                      <p:cBhvr>
-                                        <p:cTn id="19" dur="26">
-                                          <p:stCondLst>
-                                            <p:cond delay="1808"/>
-                                          </p:stCondLst>
-                                        </p:cTn>
-                                        <p:tgtEl>
-                                          <p:spTgt spid="2"/>
-                                        </p:tgtEl>
-                                      </p:cBhvr>
-                                      <p:to x="100000" y="95000"/>
-                                    </p:animScale>
-                                    <p:animScale>
-                                      <p:cBhvr>
-                                        <p:cTn id="20" dur="166" decel="50000">
-                                          <p:stCondLst>
-                                            <p:cond delay="1834"/>
-                                          </p:stCondLst>
-                                        </p:cTn>
-                                        <p:tgtEl>
-                                          <p:spTgt spid="2"/>
-                                        </p:tgtEl>
-                                      </p:cBhvr>
-                                      <p:to x="100000" y="100000"/>
-                                    </p:animScale>
+                                      </p:cBhvr>
+                                    </p:animEffect>
                                   </p:childTnLst>
                                 </p:cTn>
                               </p:par>
                               <p:par>
-                                <p:cTn id="21" presetID="26" presetClass="entr" presetSubtype="0" fill="hold" grpId="0" nodeType="withEffect" nodePh="1">
+                                <p:cTn id="8" presetID="10" presetClass="entr" presetSubtype="0" fill="hold" grpId="0" nodeType="withEffect">
+                                  <p:stCondLst>
+                                    <p:cond delay="0"/>
+                                  </p:stCondLst>
+                                  <p:childTnLst>
+                                    <p:set>
+                                      <p:cBhvr>
+                                        <p:cTn id="9" dur="1" fill="hold">
+                                          <p:stCondLst>
+                                            <p:cond delay="0"/>
+                                          </p:stCondLst>
+                                        </p:cTn>
+                                        <p:tgtEl>
+                                          <p:spTgt spid="3">
+                                            <p:txEl>
+                                              <p:pRg st="0" end="0"/>
+                                            </p:txEl>
+                                          </p:spTgt>
+                                        </p:tgtEl>
+                                        <p:attrNameLst>
+                                          <p:attrName>style.visibility</p:attrName>
+                                        </p:attrNameLst>
+                                      </p:cBhvr>
+                                      <p:to>
+                                        <p:strVal val="visible"/>
+                                      </p:to>
+                                    </p:set>
+                                    <p:animEffect transition="in" filter="fade">
+                                      <p:cBhvr>
+                                        <p:cTn id="10" dur="500"/>
+                                        <p:tgtEl>
+                                          <p:spTgt spid="3">
+                                            <p:txEl>
+                                              <p:pRg st="0" end="0"/>
+                                            </p:txEl>
+                                          </p:spTgt>
+                                        </p:tgtEl>
+                                      </p:cBhvr>
+                                    </p:animEffect>
+                                  </p:childTnLst>
+                                </p:cTn>
+                              </p:par>
+                              <p:par>
+                                <p:cTn id="11" presetID="10" presetClass="entr" presetSubtype="0" fill="hold" nodeType="withEffect">
+                                  <p:stCondLst>
+                                    <p:cond delay="0"/>
+                                  </p:stCondLst>
+                                  <p:childTnLst>
+                                    <p:set>
+                                      <p:cBhvr>
+                                        <p:cTn id="12" dur="1" fill="hold">
+                                          <p:stCondLst>
+                                            <p:cond delay="0"/>
+                                          </p:stCondLst>
+                                        </p:cTn>
+                                        <p:tgtEl>
+                                          <p:spTgt spid="11"/>
+                                        </p:tgtEl>
+                                        <p:attrNameLst>
+                                          <p:attrName>style.visibility</p:attrName>
+                                        </p:attrNameLst>
+                                      </p:cBhvr>
+                                      <p:to>
+                                        <p:strVal val="visible"/>
+                                      </p:to>
+                                    </p:set>
+                                    <p:animEffect transition="in" filter="fade">
+                                      <p:cBhvr>
+                                        <p:cTn id="13" dur="500"/>
+                                        <p:tgtEl>
+                                          <p:spTgt spid="11"/>
+                                        </p:tgtEl>
+                                      </p:cBhvr>
+                                    </p:animEffect>
+                                  </p:childTnLst>
+                                </p:cTn>
+                              </p:par>
+                              <p:par>
+                                <p:cTn id="14" presetID="10" presetClass="entr" presetSubtype="0" fill="hold" nodeType="withEffect">
+                                  <p:stCondLst>
+                                    <p:cond delay="0"/>
+                                  </p:stCondLst>
+                                  <p:childTnLst>
+                                    <p:set>
+                                      <p:cBhvr>
+                                        <p:cTn id="15" dur="1" fill="hold">
+                                          <p:stCondLst>
+                                            <p:cond delay="0"/>
+                                          </p:stCondLst>
+                                        </p:cTn>
+                                        <p:tgtEl>
+                                          <p:spTgt spid="4"/>
+                                        </p:tgtEl>
+                                        <p:attrNameLst>
+                                          <p:attrName>style.visibility</p:attrName>
+                                        </p:attrNameLst>
+                                      </p:cBhvr>
+                                      <p:to>
+                                        <p:strVal val="visible"/>
+                                      </p:to>
+                                    </p:set>
+                                    <p:animEffect transition="in" filter="fade">
+                                      <p:cBhvr>
+                                        <p:cTn id="16" dur="500"/>
+                                        <p:tgtEl>
+                                          <p:spTgt spid="4"/>
+                                        </p:tgtEl>
+                                      </p:cBhvr>
+                                    </p:animEffect>
+                                  </p:childTnLst>
+                                </p:cTn>
+                              </p:par>
+                              <p:par>
+                                <p:cTn id="17" presetID="10" presetClass="entr" presetSubtype="0" fill="hold" nodeType="withEffect">
+                                  <p:stCondLst>
+                                    <p:cond delay="0"/>
+                                  </p:stCondLst>
+                                  <p:childTnLst>
+                                    <p:set>
+                                      <p:cBhvr>
+                                        <p:cTn id="18" dur="1" fill="hold">
+                                          <p:stCondLst>
+                                            <p:cond delay="0"/>
+                                          </p:stCondLst>
+                                        </p:cTn>
+                                        <p:tgtEl>
+                                          <p:spTgt spid="6"/>
+                                        </p:tgtEl>
+                                        <p:attrNameLst>
+                                          <p:attrName>style.visibility</p:attrName>
+                                        </p:attrNameLst>
+                                      </p:cBhvr>
+                                      <p:to>
+                                        <p:strVal val="visible"/>
+                                      </p:to>
+                                    </p:set>
+                                    <p:animEffect transition="in" filter="fade">
+                                      <p:cBhvr>
+                                        <p:cTn id="19" dur="500"/>
+                                        <p:tgtEl>
+                                          <p:spTgt spid="6"/>
+                                        </p:tgtEl>
+                                      </p:cBhvr>
+                                    </p:animEffect>
+                                  </p:childTnLst>
+                                </p:cTn>
+                              </p:par>
+                              <p:par>
+                                <p:cTn id="20" presetID="10" presetClass="entr" presetSubtype="0" fill="hold" nodeType="withEffect">
+                                  <p:stCondLst>
+                                    <p:cond delay="0"/>
+                                  </p:stCondLst>
+                                  <p:childTnLst>
+                                    <p:set>
+                                      <p:cBhvr>
+                                        <p:cTn id="21" dur="1" fill="hold">
+                                          <p:stCondLst>
+                                            <p:cond delay="0"/>
+                                          </p:stCondLst>
+                                        </p:cTn>
+                                        <p:tgtEl>
+                                          <p:spTgt spid="7"/>
+                                        </p:tgtEl>
+                                        <p:attrNameLst>
+                                          <p:attrName>style.visibility</p:attrName>
+                                        </p:attrNameLst>
+                                      </p:cBhvr>
+                                      <p:to>
+                                        <p:strVal val="visible"/>
+                                      </p:to>
+                                    </p:set>
+                                    <p:animEffect transition="in" filter="fade">
+                                      <p:cBhvr>
+                                        <p:cTn id="22" dur="500"/>
+                                        <p:tgtEl>
+                                          <p:spTgt spid="7"/>
+                                        </p:tgtEl>
+                                      </p:cBhvr>
+                                    </p:animEffect>
+                                  </p:childTnLst>
+                                </p:cTn>
+                              </p:par>
+                            </p:childTnLst>
+                          </p:cTn>
+                        </p:par>
+                      </p:childTnLst>
+                    </p:cTn>
+                  </p:par>
+                </p:childTnLst>
+              </p:cTn>
+              <p:prevCondLst>
+                <p:cond evt="onPrev" delay="0">
+                  <p:tgtEl>
+                    <p:sldTgt/>
+                  </p:tgtEl>
+                </p:cond>
+              </p:prevCondLst>
+              <p:nextCondLst>
+                <p:cond evt="onNext" delay="0">
+                  <p:tgtEl>
+                    <p:sldTgt/>
+                  </p:tgtEl>
+                </p:cond>
+              </p:nextCondLst>
+            </p:seq>
+          </p:childTnLst>
+        </p:cTn>
+      </p:par>
+    </p:tnLst>
+    <p:bldLst>
+      <p:bldP spid="2" grpId="0"/>
+      <p:bldP spid="3" grpId="0" build="p"/>
+    </p:bldLst>
+  </p:timing>
+</p:sld>
+</file>
+
+<file path=ppt/slides/slide17.xml><?xml version="1.0" encoding="utf-8"?>
+<p:sld xmlns:a="http://schemas.openxmlformats.org/drawingml/2006/main" xmlns:r="http://schemas.openxmlformats.org/officeDocument/2006/relationships" xmlns:p="http://schemas.openxmlformats.org/presentationml/2006/main">
+  <p:cSld>
+    <p:spTree>
+      <p:nvGrpSpPr>
+        <p:cNvPr id="1" name=""/>
+        <p:cNvGrpSpPr/>
+        <p:nvPr/>
+      </p:nvGrpSpPr>
+      <p:grpSpPr>
+        <a:xfrm>
+          <a:off x="0" y="0"/>
+          <a:ext cx="0" cy="0"/>
+          <a:chOff x="0" y="0"/>
+          <a:chExt cx="0" cy="0"/>
+        </a:xfrm>
+      </p:grpSpPr>
+      <p:sp>
+        <p:nvSpPr>
+          <p:cNvPr id="2" name="Título 1"/>
+          <p:cNvSpPr>
+            <a:spLocks noGrp="1"/>
+          </p:cNvSpPr>
+          <p:nvPr>
+            <p:ph type="title"/>
+          </p:nvPr>
+        </p:nvSpPr>
+        <p:spPr>
+          <a:xfrm>
+            <a:off x="1197735" y="689998"/>
+            <a:ext cx="9826580" cy="997134"/>
+          </a:xfrm>
+        </p:spPr>
+        <p:txBody>
+          <a:bodyPr/>
+          <a:lstStyle/>
+          <a:p>
+            <a:r>
+              <a:rPr lang="pt-BR" sz="4400" b="1" dirty="0" err="1"/>
+              <a:t>Foreign</a:t>
+            </a:r>
+            <a:r>
+              <a:rPr lang="pt-BR" sz="4400" b="1" dirty="0"/>
+              <a:t> Key </a:t>
+            </a:r>
+            <a:r>
+              <a:rPr lang="pt-BR" sz="4400" b="1" dirty="0" smtClean="0"/>
+              <a:t>– FK (</a:t>
+            </a:r>
+            <a:r>
+              <a:rPr lang="pt-BR" sz="4400" b="1" dirty="0"/>
+              <a:t>Chave externas </a:t>
+            </a:r>
+            <a:r>
+              <a:rPr lang="pt-BR" sz="4400" b="1" dirty="0" smtClean="0"/>
+              <a:t>)</a:t>
+            </a:r>
+            <a:endParaRPr lang="pt-BR" sz="4400" b="1" dirty="0"/>
+          </a:p>
+        </p:txBody>
+      </p:sp>
+      <p:sp>
+        <p:nvSpPr>
+          <p:cNvPr id="3" name="Espaço Reservado para Conteúdo 2"/>
+          <p:cNvSpPr>
+            <a:spLocks noGrp="1"/>
+          </p:cNvSpPr>
+          <p:nvPr>
+            <p:ph idx="1"/>
+          </p:nvPr>
+        </p:nvSpPr>
+        <p:spPr>
+          <a:xfrm>
+            <a:off x="901522" y="2150772"/>
+            <a:ext cx="4971244" cy="3981450"/>
+          </a:xfrm>
+        </p:spPr>
+        <p:txBody>
+          <a:bodyPr>
+            <a:noAutofit/>
+          </a:bodyPr>
+          <a:lstStyle/>
+          <a:p>
+            <a:r>
+              <a:rPr lang="pt-BR" dirty="0"/>
+              <a:t>Chave externas ou estrangeiras (</a:t>
+            </a:r>
+            <a:r>
+              <a:rPr lang="pt-BR" dirty="0" err="1"/>
+              <a:t>Foreign</a:t>
+            </a:r>
+            <a:r>
+              <a:rPr lang="pt-BR" dirty="0"/>
+              <a:t> Key - FK) Uma chave estrangeira é um campo, que aponta para a chave primária de outra tabela ou da mesma tabela. Ou seja, passa a existir uma relação entre duplas de duas tabelas ou de uma única tabela. A finalidade da chave estrangeira é garantir a integridade dos dados referenciais, pois apenas serão permitidos valores que supostamente vão aparecer na base de dados.</a:t>
+            </a:r>
+            <a:endParaRPr lang="pt-BR" dirty="0"/>
+          </a:p>
+        </p:txBody>
+      </p:sp>
+      <p:pic>
+        <p:nvPicPr>
+          <p:cNvPr id="4" name="Imagem 3"/>
+          <p:cNvPicPr>
+            <a:picLocks noChangeAspect="1"/>
+          </p:cNvPicPr>
+          <p:nvPr/>
+        </p:nvPicPr>
+        <p:blipFill>
+          <a:blip r:embed="rId2"/>
+          <a:stretch>
+            <a:fillRect/>
+          </a:stretch>
+        </p:blipFill>
+        <p:spPr>
+          <a:xfrm>
+            <a:off x="5872766" y="2331075"/>
+            <a:ext cx="5562344" cy="3335897"/>
+          </a:xfrm>
+          <a:prstGeom prst="rect">
+            <a:avLst/>
+          </a:prstGeom>
+        </p:spPr>
+      </p:pic>
+    </p:spTree>
+    <p:extLst>
+      <p:ext uri="{BB962C8B-B14F-4D97-AF65-F5344CB8AC3E}">
+        <p14:creationId xmlns:p14="http://schemas.microsoft.com/office/powerpoint/2010/main" val="1598186152"/>
+      </p:ext>
+    </p:extLst>
+  </p:cSld>
+  <p:clrMapOvr>
+    <a:masterClrMapping/>
+  </p:clrMapOvr>
+  <p:timing>
+    <p:tnLst>
+      <p:par>
+        <p:cTn id="1" dur="indefinite" restart="never" nodeType="tmRoot">
+          <p:childTnLst>
+            <p:seq concurrent="1" nextAc="seek">
+              <p:cTn id="2" dur="indefinite" nodeType="mainSeq">
+                <p:childTnLst>
+                  <p:par>
+                    <p:cTn id="3" fill="hold">
+                      <p:stCondLst>
+                        <p:cond delay="indefinite"/>
+                      </p:stCondLst>
+                      <p:childTnLst>
+                        <p:par>
+                          <p:cTn id="4" fill="hold">
+                            <p:stCondLst>
+                              <p:cond delay="0"/>
+                            </p:stCondLst>
+                            <p:childTnLst>
+                              <p:par>
+                                <p:cTn id="5" presetID="10" presetClass="entr" presetSubtype="0" fill="hold" grpId="0" nodeType="clickEffect">
+                                  <p:stCondLst>
+                                    <p:cond delay="0"/>
+                                  </p:stCondLst>
+                                  <p:childTnLst>
+                                    <p:set>
+                                      <p:cBhvr>
+                                        <p:cTn id="6" dur="1" fill="hold">
+                                          <p:stCondLst>
+                                            <p:cond delay="0"/>
+                                          </p:stCondLst>
+                                        </p:cTn>
+                                        <p:tgtEl>
+                                          <p:spTgt spid="2"/>
+                                        </p:tgtEl>
+                                        <p:attrNameLst>
+                                          <p:attrName>style.visibility</p:attrName>
+                                        </p:attrNameLst>
+                                      </p:cBhvr>
+                                      <p:to>
+                                        <p:strVal val="visible"/>
+                                      </p:to>
+                                    </p:set>
+                                    <p:animEffect transition="in" filter="fade">
+                                      <p:cBhvr>
+                                        <p:cTn id="7" dur="500"/>
+                                        <p:tgtEl>
+                                          <p:spTgt spid="2"/>
+                                        </p:tgtEl>
+                                      </p:cBhvr>
+                                    </p:animEffect>
+                                  </p:childTnLst>
+                                </p:cTn>
+                              </p:par>
+                              <p:par>
+                                <p:cTn id="8" presetID="10" presetClass="entr" presetSubtype="0" fill="hold" grpId="0" nodeType="withEffect">
+                                  <p:stCondLst>
+                                    <p:cond delay="0"/>
+                                  </p:stCondLst>
+                                  <p:childTnLst>
+                                    <p:set>
+                                      <p:cBhvr>
+                                        <p:cTn id="9" dur="1" fill="hold">
+                                          <p:stCondLst>
+                                            <p:cond delay="0"/>
+                                          </p:stCondLst>
+                                        </p:cTn>
+                                        <p:tgtEl>
+                                          <p:spTgt spid="3">
+                                            <p:txEl>
+                                              <p:pRg st="0" end="0"/>
+                                            </p:txEl>
+                                          </p:spTgt>
+                                        </p:tgtEl>
+                                        <p:attrNameLst>
+                                          <p:attrName>style.visibility</p:attrName>
+                                        </p:attrNameLst>
+                                      </p:cBhvr>
+                                      <p:to>
+                                        <p:strVal val="visible"/>
+                                      </p:to>
+                                    </p:set>
+                                    <p:animEffect transition="in" filter="fade">
+                                      <p:cBhvr>
+                                        <p:cTn id="10" dur="500"/>
+                                        <p:tgtEl>
+                                          <p:spTgt spid="3">
+                                            <p:txEl>
+                                              <p:pRg st="0" end="0"/>
+                                            </p:txEl>
+                                          </p:spTgt>
+                                        </p:tgtEl>
+                                      </p:cBhvr>
+                                    </p:animEffect>
+                                  </p:childTnLst>
+                                </p:cTn>
+                              </p:par>
+                            </p:childTnLst>
+                          </p:cTn>
+                        </p:par>
+                      </p:childTnLst>
+                    </p:cTn>
+                  </p:par>
+                  <p:par>
+                    <p:cTn id="11" fill="hold">
+                      <p:stCondLst>
+                        <p:cond delay="indefinite"/>
+                      </p:stCondLst>
+                      <p:childTnLst>
+                        <p:par>
+                          <p:cTn id="12" fill="hold">
+                            <p:stCondLst>
+                              <p:cond delay="0"/>
+                            </p:stCondLst>
+                            <p:childTnLst>
+                              <p:par>
+                                <p:cTn id="13" presetID="10" presetClass="entr" presetSubtype="0" fill="hold" nodeType="clickEffect">
+                                  <p:stCondLst>
+                                    <p:cond delay="0"/>
+                                  </p:stCondLst>
+                                  <p:childTnLst>
+                                    <p:set>
+                                      <p:cBhvr>
+                                        <p:cTn id="14" dur="1" fill="hold">
+                                          <p:stCondLst>
+                                            <p:cond delay="0"/>
+                                          </p:stCondLst>
+                                        </p:cTn>
+                                        <p:tgtEl>
+                                          <p:spTgt spid="4"/>
+                                        </p:tgtEl>
+                                        <p:attrNameLst>
+                                          <p:attrName>style.visibility</p:attrName>
+                                        </p:attrNameLst>
+                                      </p:cBhvr>
+                                      <p:to>
+                                        <p:strVal val="visible"/>
+                                      </p:to>
+                                    </p:set>
+                                    <p:animEffect transition="in" filter="fade">
+                                      <p:cBhvr>
+                                        <p:cTn id="15" dur="500"/>
+                                        <p:tgtEl>
+                                          <p:spTgt spid="4"/>
+                                        </p:tgtEl>
+                                      </p:cBhvr>
+                                    </p:animEffect>
+                                  </p:childTnLst>
+                                </p:cTn>
+                              </p:par>
+                            </p:childTnLst>
+                          </p:cTn>
+                        </p:par>
+                      </p:childTnLst>
+                    </p:cTn>
+                  </p:par>
+                </p:childTnLst>
+              </p:cTn>
+              <p:prevCondLst>
+                <p:cond evt="onPrev" delay="0">
+                  <p:tgtEl>
+                    <p:sldTgt/>
+                  </p:tgtEl>
+                </p:cond>
+              </p:prevCondLst>
+              <p:nextCondLst>
+                <p:cond evt="onNext" delay="0">
+                  <p:tgtEl>
+                    <p:sldTgt/>
+                  </p:tgtEl>
+                </p:cond>
+              </p:nextCondLst>
+            </p:seq>
+          </p:childTnLst>
+        </p:cTn>
+      </p:par>
+    </p:tnLst>
+    <p:bldLst>
+      <p:bldP spid="2" grpId="0"/>
+      <p:bldP spid="3" grpId="0" build="p"/>
+    </p:bldLst>
+  </p:timing>
+</p:sld>
+</file>
+
+<file path=ppt/slides/slide18.xml><?xml version="1.0" encoding="utf-8"?>
+<p:sld xmlns:a="http://schemas.openxmlformats.org/drawingml/2006/main" xmlns:r="http://schemas.openxmlformats.org/officeDocument/2006/relationships" xmlns:p="http://schemas.openxmlformats.org/presentationml/2006/main">
+  <p:cSld>
+    <p:spTree>
+      <p:nvGrpSpPr>
+        <p:cNvPr id="1" name=""/>
+        <p:cNvGrpSpPr/>
+        <p:nvPr/>
+      </p:nvGrpSpPr>
+      <p:grpSpPr>
+        <a:xfrm>
+          <a:off x="0" y="0"/>
+          <a:ext cx="0" cy="0"/>
+          <a:chOff x="0" y="0"/>
+          <a:chExt cx="0" cy="0"/>
+        </a:xfrm>
+      </p:grpSpPr>
+      <p:sp>
+        <p:nvSpPr>
+          <p:cNvPr id="3" name="Espaço Reservado para Conteúdo 2"/>
+          <p:cNvSpPr>
+            <a:spLocks noGrp="1"/>
+          </p:cNvSpPr>
+          <p:nvPr>
+            <p:ph idx="1"/>
+          </p:nvPr>
+        </p:nvSpPr>
+        <p:spPr>
+          <a:xfrm>
+            <a:off x="9852338" y="3245476"/>
+            <a:ext cx="1030308" cy="2886746"/>
+          </a:xfrm>
+        </p:spPr>
+        <p:txBody>
+          <a:bodyPr>
+            <a:noAutofit/>
+          </a:bodyPr>
+          <a:lstStyle/>
+          <a:p>
+            <a:endParaRPr lang="pt-BR" dirty="0"/>
+          </a:p>
+        </p:txBody>
+      </p:sp>
+      <p:pic>
+        <p:nvPicPr>
+          <p:cNvPr id="4" name="Imagem 3"/>
+          <p:cNvPicPr>
+            <a:picLocks noChangeAspect="1"/>
+          </p:cNvPicPr>
+          <p:nvPr/>
+        </p:nvPicPr>
+        <p:blipFill>
+          <a:blip r:embed="rId2"/>
+          <a:stretch>
+            <a:fillRect/>
+          </a:stretch>
+        </p:blipFill>
+        <p:spPr>
+          <a:xfrm>
+            <a:off x="2146010" y="1759850"/>
+            <a:ext cx="7474510" cy="4372372"/>
+          </a:xfrm>
+          <a:prstGeom prst="rect">
+            <a:avLst/>
+          </a:prstGeom>
+        </p:spPr>
+      </p:pic>
+      <p:sp>
+        <p:nvSpPr>
+          <p:cNvPr id="7" name="Título 1"/>
+          <p:cNvSpPr>
+            <a:spLocks noGrp="1"/>
+          </p:cNvSpPr>
+          <p:nvPr>
+            <p:ph type="title"/>
+          </p:nvPr>
+        </p:nvSpPr>
+        <p:spPr>
+          <a:xfrm>
+            <a:off x="1197735" y="689998"/>
+            <a:ext cx="9826580" cy="997134"/>
+          </a:xfrm>
+        </p:spPr>
+        <p:txBody>
+          <a:bodyPr/>
+          <a:lstStyle/>
+          <a:p>
+            <a:r>
+              <a:rPr lang="pt-BR" sz="4400" b="1" dirty="0" err="1"/>
+              <a:t>Foreign</a:t>
+            </a:r>
+            <a:r>
+              <a:rPr lang="pt-BR" sz="4400" b="1" dirty="0"/>
+              <a:t> Key </a:t>
+            </a:r>
+            <a:r>
+              <a:rPr lang="pt-BR" sz="4400" b="1" dirty="0" smtClean="0"/>
+              <a:t>– FK (</a:t>
+            </a:r>
+            <a:r>
+              <a:rPr lang="pt-BR" sz="4400" b="1" dirty="0"/>
+              <a:t>Chave externas </a:t>
+            </a:r>
+            <a:r>
+              <a:rPr lang="pt-BR" sz="4400" b="1" dirty="0" smtClean="0"/>
+              <a:t>)</a:t>
+            </a:r>
+            <a:endParaRPr lang="pt-BR" sz="4400" b="1" dirty="0"/>
+          </a:p>
+        </p:txBody>
+      </p:sp>
+    </p:spTree>
+    <p:extLst>
+      <p:ext uri="{BB962C8B-B14F-4D97-AF65-F5344CB8AC3E}">
+        <p14:creationId xmlns:p14="http://schemas.microsoft.com/office/powerpoint/2010/main" val="1080304056"/>
+      </p:ext>
+    </p:extLst>
+  </p:cSld>
+  <p:clrMapOvr>
+    <a:masterClrMapping/>
+  </p:clrMapOvr>
+  <p:timing>
+    <p:tnLst>
+      <p:par>
+        <p:cTn id="1" dur="indefinite" restart="never" nodeType="tmRoot">
+          <p:childTnLst>
+            <p:seq concurrent="1" nextAc="seek">
+              <p:cTn id="2" dur="indefinite" nodeType="mainSeq">
+                <p:childTnLst>
+                  <p:par>
+                    <p:cTn id="3" fill="hold">
+                      <p:stCondLst>
+                        <p:cond delay="indefinite"/>
+                      </p:stCondLst>
+                      <p:childTnLst>
+                        <p:par>
+                          <p:cTn id="4" fill="hold">
+                            <p:stCondLst>
+                              <p:cond delay="0"/>
+                            </p:stCondLst>
+                            <p:childTnLst>
+                              <p:par>
+                                <p:cTn id="5" presetID="10" presetClass="entr" presetSubtype="0" fill="hold" grpId="0" nodeType="clickEffect" nodePh="1">
                                   <p:stCondLst>
                                     <p:cond delay="0"/>
                                   </p:stCondLst>
                                   <p:endCondLst>
                                     <p:cond evt="begin" delay="0">
-                                      <p:tn val="21"/>
+                                      <p:tn val="5"/>
                                     </p:cond>
                                   </p:endCondLst>
                                   <p:childTnLst>
                                     <p:set>
                                       <p:cBhvr>
-                                        <p:cTn id="22" dur="1" fill="hold">
+                                        <p:cTn id="6" dur="1" fill="hold">
                                           <p:stCondLst>
                                             <p:cond delay="0"/>
                                           </p:stCondLst>
@@ -10282,13 +11188,9 @@
                                         <p:strVal val="visible"/>
                                       </p:to>
                                     </p:set>
-                                    <p:animEffect transition="in" filter="wipe(down)">
-                                      <p:cBhvr>
-                                        <p:cTn id="23" dur="580">
-                                          <p:stCondLst>
-                                            <p:cond delay="0"/>
-                                          </p:stCondLst>
-                                        </p:cTn>
+                                    <p:animEffect transition="in" filter="fade">
+                                      <p:cBhvr>
+                                        <p:cTn id="7" dur="500"/>
                                         <p:tgtEl>
                                           <p:spTgt spid="3">
                                             <p:txEl>
@@ -10298,9 +11200,287 @@
                                         </p:tgtEl>
                                       </p:cBhvr>
                                     </p:animEffect>
-                                    <p:anim calcmode="lin" valueType="num">
-                                      <p:cBhvr>
-                                        <p:cTn id="24" dur="1822" tmFilter="0,0; 0.14,0.36; 0.43,0.73; 0.71,0.91; 1.0,1.0">
+                                  </p:childTnLst>
+                                </p:cTn>
+                              </p:par>
+                              <p:par>
+                                <p:cTn id="8" presetID="10" presetClass="entr" presetSubtype="0" fill="hold" grpId="0" nodeType="withEffect">
+                                  <p:stCondLst>
+                                    <p:cond delay="0"/>
+                                  </p:stCondLst>
+                                  <p:childTnLst>
+                                    <p:set>
+                                      <p:cBhvr>
+                                        <p:cTn id="9" dur="1" fill="hold">
+                                          <p:stCondLst>
+                                            <p:cond delay="0"/>
+                                          </p:stCondLst>
+                                        </p:cTn>
+                                        <p:tgtEl>
+                                          <p:spTgt spid="7"/>
+                                        </p:tgtEl>
+                                        <p:attrNameLst>
+                                          <p:attrName>style.visibility</p:attrName>
+                                        </p:attrNameLst>
+                                      </p:cBhvr>
+                                      <p:to>
+                                        <p:strVal val="visible"/>
+                                      </p:to>
+                                    </p:set>
+                                    <p:animEffect transition="in" filter="fade">
+                                      <p:cBhvr>
+                                        <p:cTn id="10" dur="500"/>
+                                        <p:tgtEl>
+                                          <p:spTgt spid="7"/>
+                                        </p:tgtEl>
+                                      </p:cBhvr>
+                                    </p:animEffect>
+                                  </p:childTnLst>
+                                </p:cTn>
+                              </p:par>
+                              <p:par>
+                                <p:cTn id="11" presetID="10" presetClass="entr" presetSubtype="0" fill="hold" nodeType="withEffect">
+                                  <p:stCondLst>
+                                    <p:cond delay="0"/>
+                                  </p:stCondLst>
+                                  <p:childTnLst>
+                                    <p:set>
+                                      <p:cBhvr>
+                                        <p:cTn id="12" dur="1" fill="hold">
+                                          <p:stCondLst>
+                                            <p:cond delay="0"/>
+                                          </p:stCondLst>
+                                        </p:cTn>
+                                        <p:tgtEl>
+                                          <p:spTgt spid="4"/>
+                                        </p:tgtEl>
+                                        <p:attrNameLst>
+                                          <p:attrName>style.visibility</p:attrName>
+                                        </p:attrNameLst>
+                                      </p:cBhvr>
+                                      <p:to>
+                                        <p:strVal val="visible"/>
+                                      </p:to>
+                                    </p:set>
+                                    <p:animEffect transition="in" filter="fade">
+                                      <p:cBhvr>
+                                        <p:cTn id="13" dur="500"/>
+                                        <p:tgtEl>
+                                          <p:spTgt spid="4"/>
+                                        </p:tgtEl>
+                                      </p:cBhvr>
+                                    </p:animEffect>
+                                  </p:childTnLst>
+                                </p:cTn>
+                              </p:par>
+                            </p:childTnLst>
+                          </p:cTn>
+                        </p:par>
+                      </p:childTnLst>
+                    </p:cTn>
+                  </p:par>
+                </p:childTnLst>
+              </p:cTn>
+              <p:prevCondLst>
+                <p:cond evt="onPrev" delay="0">
+                  <p:tgtEl>
+                    <p:sldTgt/>
+                  </p:tgtEl>
+                </p:cond>
+              </p:prevCondLst>
+              <p:nextCondLst>
+                <p:cond evt="onNext" delay="0">
+                  <p:tgtEl>
+                    <p:sldTgt/>
+                  </p:tgtEl>
+                </p:cond>
+              </p:nextCondLst>
+            </p:seq>
+          </p:childTnLst>
+        </p:cTn>
+      </p:par>
+    </p:tnLst>
+    <p:bldLst>
+      <p:bldP spid="3" grpId="0" build="p"/>
+      <p:bldP spid="7" grpId="0"/>
+    </p:bldLst>
+  </p:timing>
+</p:sld>
+</file>
+
+<file path=ppt/slides/slide19.xml><?xml version="1.0" encoding="utf-8"?>
+<p:sld xmlns:a="http://schemas.openxmlformats.org/drawingml/2006/main" xmlns:r="http://schemas.openxmlformats.org/officeDocument/2006/relationships" xmlns:p="http://schemas.openxmlformats.org/presentationml/2006/main">
+  <p:cSld>
+    <p:spTree>
+      <p:nvGrpSpPr>
+        <p:cNvPr id="1" name=""/>
+        <p:cNvGrpSpPr/>
+        <p:nvPr/>
+      </p:nvGrpSpPr>
+      <p:grpSpPr>
+        <a:xfrm>
+          <a:off x="0" y="0"/>
+          <a:ext cx="0" cy="0"/>
+          <a:chOff x="0" y="0"/>
+          <a:chExt cx="0" cy="0"/>
+        </a:xfrm>
+      </p:grpSpPr>
+      <p:sp>
+        <p:nvSpPr>
+          <p:cNvPr id="2" name="Título 1"/>
+          <p:cNvSpPr>
+            <a:spLocks noGrp="1"/>
+          </p:cNvSpPr>
+          <p:nvPr>
+            <p:ph type="title"/>
+          </p:nvPr>
+        </p:nvSpPr>
+        <p:spPr>
+          <a:xfrm>
+            <a:off x="1197735" y="689998"/>
+            <a:ext cx="9826580" cy="997134"/>
+          </a:xfrm>
+        </p:spPr>
+        <p:txBody>
+          <a:bodyPr/>
+          <a:lstStyle/>
+          <a:p>
+            <a:r>
+              <a:rPr lang="pt-BR" sz="4400" b="1" dirty="0"/>
+              <a:t>Relação entre tabelas</a:t>
+            </a:r>
+            <a:endParaRPr lang="pt-BR" sz="4400" b="1" dirty="0"/>
+          </a:p>
+        </p:txBody>
+      </p:sp>
+      <p:sp>
+        <p:nvSpPr>
+          <p:cNvPr id="3" name="Espaço Reservado para Conteúdo 2"/>
+          <p:cNvSpPr>
+            <a:spLocks noGrp="1"/>
+          </p:cNvSpPr>
+          <p:nvPr>
+            <p:ph idx="1"/>
+          </p:nvPr>
+        </p:nvSpPr>
+        <p:spPr>
+          <a:xfrm>
+            <a:off x="1049629" y="2150772"/>
+            <a:ext cx="4971244" cy="3981450"/>
+          </a:xfrm>
+        </p:spPr>
+        <p:txBody>
+          <a:bodyPr>
+            <a:noAutofit/>
+          </a:bodyPr>
+          <a:lstStyle/>
+          <a:p>
+            <a:r>
+              <a:rPr lang="pt-BR" dirty="0"/>
+              <a:t>Relação entre tabelas: Regras de Relacionamento N:N– Para estabelecer este tipo de relacionamento, devemos ter três tabelas, sendo que a terceira é responsável por relacionar as outras duas. Para isso, é preciso que essas duas primeiras tabelas contenham uma coluna que seja chave primária.</a:t>
+            </a:r>
+            <a:endParaRPr lang="pt-BR" dirty="0"/>
+          </a:p>
+        </p:txBody>
+      </p:sp>
+      <p:pic>
+        <p:nvPicPr>
+          <p:cNvPr id="6" name="Imagem 5"/>
+          <p:cNvPicPr>
+            <a:picLocks noChangeAspect="1"/>
+          </p:cNvPicPr>
+          <p:nvPr/>
+        </p:nvPicPr>
+        <p:blipFill>
+          <a:blip r:embed="rId2"/>
+          <a:stretch>
+            <a:fillRect/>
+          </a:stretch>
+        </p:blipFill>
+        <p:spPr>
+          <a:xfrm>
+            <a:off x="6377323" y="1685059"/>
+            <a:ext cx="3758350" cy="4912876"/>
+          </a:xfrm>
+          <a:prstGeom prst="rect">
+            <a:avLst/>
+          </a:prstGeom>
+        </p:spPr>
+      </p:pic>
+    </p:spTree>
+    <p:extLst>
+      <p:ext uri="{BB962C8B-B14F-4D97-AF65-F5344CB8AC3E}">
+        <p14:creationId xmlns:p14="http://schemas.microsoft.com/office/powerpoint/2010/main" val="3059978664"/>
+      </p:ext>
+    </p:extLst>
+  </p:cSld>
+  <p:clrMapOvr>
+    <a:masterClrMapping/>
+  </p:clrMapOvr>
+  <p:timing>
+    <p:tnLst>
+      <p:par>
+        <p:cTn id="1" dur="indefinite" restart="never" nodeType="tmRoot">
+          <p:childTnLst>
+            <p:seq concurrent="1" nextAc="seek">
+              <p:cTn id="2" dur="indefinite" nodeType="mainSeq">
+                <p:childTnLst>
+                  <p:par>
+                    <p:cTn id="3" fill="hold">
+                      <p:stCondLst>
+                        <p:cond delay="indefinite"/>
+                      </p:stCondLst>
+                      <p:childTnLst>
+                        <p:par>
+                          <p:cTn id="4" fill="hold">
+                            <p:stCondLst>
+                              <p:cond delay="0"/>
+                            </p:stCondLst>
+                            <p:childTnLst>
+                              <p:par>
+                                <p:cTn id="5" presetID="10" presetClass="entr" presetSubtype="0" fill="hold" grpId="0" nodeType="clickEffect">
+                                  <p:stCondLst>
+                                    <p:cond delay="0"/>
+                                  </p:stCondLst>
+                                  <p:childTnLst>
+                                    <p:set>
+                                      <p:cBhvr>
+                                        <p:cTn id="6" dur="1" fill="hold">
+                                          <p:stCondLst>
+                                            <p:cond delay="0"/>
+                                          </p:stCondLst>
+                                        </p:cTn>
+                                        <p:tgtEl>
+                                          <p:spTgt spid="2"/>
+                                        </p:tgtEl>
+                                        <p:attrNameLst>
+                                          <p:attrName>style.visibility</p:attrName>
+                                        </p:attrNameLst>
+                                      </p:cBhvr>
+                                      <p:to>
+                                        <p:strVal val="visible"/>
+                                      </p:to>
+                                    </p:set>
+                                    <p:animEffect transition="in" filter="fade">
+                                      <p:cBhvr>
+                                        <p:cTn id="7" dur="500"/>
+                                        <p:tgtEl>
+                                          <p:spTgt spid="2"/>
+                                        </p:tgtEl>
+                                      </p:cBhvr>
+                                    </p:animEffect>
+                                  </p:childTnLst>
+                                </p:cTn>
+                              </p:par>
+                              <p:par>
+                                <p:cTn id="8" presetID="10" presetClass="entr" presetSubtype="0" fill="hold" grpId="0" nodeType="withEffect">
+                                  <p:stCondLst>
+                                    <p:cond delay="0"/>
+                                  </p:stCondLst>
+                                  <p:childTnLst>
+                                    <p:set>
+                                      <p:cBhvr>
+                                        <p:cTn id="9" dur="1" fill="hold">
                                           <p:stCondLst>
                                             <p:cond delay="0"/>
                                           </p:stCondLst>
@@ -10313,29 +11493,16 @@
                                           </p:spTgt>
                                         </p:tgtEl>
                                         <p:attrNameLst>
-                                          <p:attrName>ppt_x</p:attrName>
+                                          <p:attrName>style.visibility</p:attrName>
                                         </p:attrNameLst>
                                       </p:cBhvr>
-                                      <p:tavLst>
-                                        <p:tav tm="0">
-                                          <p:val>
-                                            <p:strVal val="#ppt_x-0.25"/>
-                                          </p:val>
-                                        </p:tav>
-                                        <p:tav tm="100000">
-                                          <p:val>
-                                            <p:strVal val="#ppt_x"/>
-                                          </p:val>
-                                        </p:tav>
-                                      </p:tavLst>
-                                    </p:anim>
-                                    <p:anim calcmode="lin" valueType="num">
-                                      <p:cBhvr>
-                                        <p:cTn id="25" dur="664" tmFilter="0.0,0.0; 0.25,0.07; 0.50,0.2; 0.75,0.467; 1.0,1.0">
-                                          <p:stCondLst>
-                                            <p:cond delay="0"/>
-                                          </p:stCondLst>
-                                        </p:cTn>
+                                      <p:to>
+                                        <p:strVal val="visible"/>
+                                      </p:to>
+                                    </p:set>
+                                    <p:animEffect transition="in" filter="fade">
+                                      <p:cBhvr>
+                                        <p:cTn id="10" dur="500"/>
                                         <p:tgtEl>
                                           <p:spTgt spid="3">
                                             <p:txEl>
@@ -10343,270 +11510,26 @@
                                             </p:txEl>
                                           </p:spTgt>
                                         </p:tgtEl>
-                                        <p:attrNameLst>
-                                          <p:attrName>ppt_y</p:attrName>
-                                        </p:attrNameLst>
-                                      </p:cBhvr>
-                                      <p:tavLst>
-                                        <p:tav tm="0" fmla="#ppt_y-sin(pi*$)/3">
-                                          <p:val>
-                                            <p:fltVal val="0.5"/>
-                                          </p:val>
-                                        </p:tav>
-                                        <p:tav tm="100000">
-                                          <p:val>
-                                            <p:fltVal val="1"/>
-                                          </p:val>
-                                        </p:tav>
-                                      </p:tavLst>
-                                    </p:anim>
-                                    <p:anim calcmode="lin" valueType="num">
-                                      <p:cBhvr>
-                                        <p:cTn id="26" dur="664" tmFilter="0, 0; 0.125,0.2665; 0.25,0.4; 0.375,0.465; 0.5,0.5;  0.625,0.535; 0.75,0.6; 0.875,0.7335; 1,1">
-                                          <p:stCondLst>
-                                            <p:cond delay="664"/>
-                                          </p:stCondLst>
-                                        </p:cTn>
-                                        <p:tgtEl>
-                                          <p:spTgt spid="3">
-                                            <p:txEl>
-                                              <p:pRg st="0" end="0"/>
-                                            </p:txEl>
-                                          </p:spTgt>
-                                        </p:tgtEl>
-                                        <p:attrNameLst>
-                                          <p:attrName>ppt_y</p:attrName>
-                                        </p:attrNameLst>
-                                      </p:cBhvr>
-                                      <p:tavLst>
-                                        <p:tav tm="0" fmla="#ppt_y-sin(pi*$)/9">
-                                          <p:val>
-                                            <p:fltVal val="0"/>
-                                          </p:val>
-                                        </p:tav>
-                                        <p:tav tm="100000">
-                                          <p:val>
-                                            <p:fltVal val="1"/>
-                                          </p:val>
-                                        </p:tav>
-                                      </p:tavLst>
-                                    </p:anim>
-                                    <p:anim calcmode="lin" valueType="num">
-                                      <p:cBhvr>
-                                        <p:cTn id="27" dur="332" tmFilter="0, 0; 0.125,0.2665; 0.25,0.4; 0.375,0.465; 0.5,0.5;  0.625,0.535; 0.75,0.6; 0.875,0.7335; 1,1">
-                                          <p:stCondLst>
-                                            <p:cond delay="1324"/>
-                                          </p:stCondLst>
-                                        </p:cTn>
-                                        <p:tgtEl>
-                                          <p:spTgt spid="3">
-                                            <p:txEl>
-                                              <p:pRg st="0" end="0"/>
-                                            </p:txEl>
-                                          </p:spTgt>
-                                        </p:tgtEl>
-                                        <p:attrNameLst>
-                                          <p:attrName>ppt_y</p:attrName>
-                                        </p:attrNameLst>
-                                      </p:cBhvr>
-                                      <p:tavLst>
-                                        <p:tav tm="0" fmla="#ppt_y-sin(pi*$)/27">
-                                          <p:val>
-                                            <p:fltVal val="0"/>
-                                          </p:val>
-                                        </p:tav>
-                                        <p:tav tm="100000">
-                                          <p:val>
-                                            <p:fltVal val="1"/>
-                                          </p:val>
-                                        </p:tav>
-                                      </p:tavLst>
-                                    </p:anim>
-                                    <p:anim calcmode="lin" valueType="num">
-                                      <p:cBhvr>
-                                        <p:cTn id="28" dur="164" tmFilter="0, 0; 0.125,0.2665; 0.25,0.4; 0.375,0.465; 0.5,0.5;  0.625,0.535; 0.75,0.6; 0.875,0.7335; 1,1">
-                                          <p:stCondLst>
-                                            <p:cond delay="1656"/>
-                                          </p:stCondLst>
-                                        </p:cTn>
-                                        <p:tgtEl>
-                                          <p:spTgt spid="3">
-                                            <p:txEl>
-                                              <p:pRg st="0" end="0"/>
-                                            </p:txEl>
-                                          </p:spTgt>
-                                        </p:tgtEl>
-                                        <p:attrNameLst>
-                                          <p:attrName>ppt_y</p:attrName>
-                                        </p:attrNameLst>
-                                      </p:cBhvr>
-                                      <p:tavLst>
-                                        <p:tav tm="0" fmla="#ppt_y-sin(pi*$)/81">
-                                          <p:val>
-                                            <p:fltVal val="0"/>
-                                          </p:val>
-                                        </p:tav>
-                                        <p:tav tm="100000">
-                                          <p:val>
-                                            <p:fltVal val="1"/>
-                                          </p:val>
-                                        </p:tav>
-                                      </p:tavLst>
-                                    </p:anim>
-                                    <p:animScale>
-                                      <p:cBhvr>
-                                        <p:cTn id="29" dur="26">
-                                          <p:stCondLst>
-                                            <p:cond delay="650"/>
-                                          </p:stCondLst>
-                                        </p:cTn>
-                                        <p:tgtEl>
-                                          <p:spTgt spid="3">
-                                            <p:txEl>
-                                              <p:pRg st="0" end="0"/>
-                                            </p:txEl>
-                                          </p:spTgt>
-                                        </p:tgtEl>
-                                      </p:cBhvr>
-                                      <p:to x="100000" y="60000"/>
-                                    </p:animScale>
-                                    <p:animScale>
-                                      <p:cBhvr>
-                                        <p:cTn id="30" dur="166" decel="50000">
-                                          <p:stCondLst>
-                                            <p:cond delay="676"/>
-                                          </p:stCondLst>
-                                        </p:cTn>
-                                        <p:tgtEl>
-                                          <p:spTgt spid="3">
-                                            <p:txEl>
-                                              <p:pRg st="0" end="0"/>
-                                            </p:txEl>
-                                          </p:spTgt>
-                                        </p:tgtEl>
-                                      </p:cBhvr>
-                                      <p:to x="100000" y="100000"/>
-                                    </p:animScale>
-                                    <p:animScale>
-                                      <p:cBhvr>
-                                        <p:cTn id="31" dur="26">
-                                          <p:stCondLst>
-                                            <p:cond delay="1312"/>
-                                          </p:stCondLst>
-                                        </p:cTn>
-                                        <p:tgtEl>
-                                          <p:spTgt spid="3">
-                                            <p:txEl>
-                                              <p:pRg st="0" end="0"/>
-                                            </p:txEl>
-                                          </p:spTgt>
-                                        </p:tgtEl>
-                                      </p:cBhvr>
-                                      <p:to x="100000" y="80000"/>
-                                    </p:animScale>
-                                    <p:animScale>
-                                      <p:cBhvr>
-                                        <p:cTn id="32" dur="166" decel="50000">
-                                          <p:stCondLst>
-                                            <p:cond delay="1338"/>
-                                          </p:stCondLst>
-                                        </p:cTn>
-                                        <p:tgtEl>
-                                          <p:spTgt spid="3">
-                                            <p:txEl>
-                                              <p:pRg st="0" end="0"/>
-                                            </p:txEl>
-                                          </p:spTgt>
-                                        </p:tgtEl>
-                                      </p:cBhvr>
-                                      <p:to x="100000" y="100000"/>
-                                    </p:animScale>
-                                    <p:animScale>
-                                      <p:cBhvr>
-                                        <p:cTn id="33" dur="26">
-                                          <p:stCondLst>
-                                            <p:cond delay="1642"/>
-                                          </p:stCondLst>
-                                        </p:cTn>
-                                        <p:tgtEl>
-                                          <p:spTgt spid="3">
-                                            <p:txEl>
-                                              <p:pRg st="0" end="0"/>
-                                            </p:txEl>
-                                          </p:spTgt>
-                                        </p:tgtEl>
-                                      </p:cBhvr>
-                                      <p:to x="100000" y="90000"/>
-                                    </p:animScale>
-                                    <p:animScale>
-                                      <p:cBhvr>
-                                        <p:cTn id="34" dur="166" decel="50000">
-                                          <p:stCondLst>
-                                            <p:cond delay="1668"/>
-                                          </p:stCondLst>
-                                        </p:cTn>
-                                        <p:tgtEl>
-                                          <p:spTgt spid="3">
-                                            <p:txEl>
-                                              <p:pRg st="0" end="0"/>
-                                            </p:txEl>
-                                          </p:spTgt>
-                                        </p:tgtEl>
-                                      </p:cBhvr>
-                                      <p:to x="100000" y="100000"/>
-                                    </p:animScale>
-                                    <p:animScale>
-                                      <p:cBhvr>
-                                        <p:cTn id="35" dur="26">
-                                          <p:stCondLst>
-                                            <p:cond delay="1808"/>
-                                          </p:stCondLst>
-                                        </p:cTn>
-                                        <p:tgtEl>
-                                          <p:spTgt spid="3">
-                                            <p:txEl>
-                                              <p:pRg st="0" end="0"/>
-                                            </p:txEl>
-                                          </p:spTgt>
-                                        </p:tgtEl>
-                                      </p:cBhvr>
-                                      <p:to x="100000" y="95000"/>
-                                    </p:animScale>
-                                    <p:animScale>
-                                      <p:cBhvr>
-                                        <p:cTn id="36" dur="166" decel="50000">
-                                          <p:stCondLst>
-                                            <p:cond delay="1834"/>
-                                          </p:stCondLst>
-                                        </p:cTn>
-                                        <p:tgtEl>
-                                          <p:spTgt spid="3">
-                                            <p:txEl>
-                                              <p:pRg st="0" end="0"/>
-                                            </p:txEl>
-                                          </p:spTgt>
-                                        </p:tgtEl>
-                                      </p:cBhvr>
-                                      <p:to x="100000" y="100000"/>
-                                    </p:animScale>
+                                      </p:cBhvr>
+                                    </p:animEffect>
                                   </p:childTnLst>
                                 </p:cTn>
                               </p:par>
                               <p:par>
-                                <p:cTn id="37" presetID="26" presetClass="entr" presetSubtype="0" fill="hold" nodeType="withEffect">
+                                <p:cTn id="11" presetID="10" presetClass="entr" presetSubtype="0" fill="hold" nodeType="withEffect">
                                   <p:stCondLst>
                                     <p:cond delay="0"/>
                                   </p:stCondLst>
                                   <p:childTnLst>
                                     <p:set>
                                       <p:cBhvr>
-                                        <p:cTn id="38" dur="1" fill="hold">
+                                        <p:cTn id="12" dur="1" fill="hold">
                                           <p:stCondLst>
                                             <p:cond delay="0"/>
                                           </p:stCondLst>
                                         </p:cTn>
                                         <p:tgtEl>
-                                          <p:spTgt spid="4"/>
+                                          <p:spTgt spid="6"/>
                                         </p:tgtEl>
                                         <p:attrNameLst>
                                           <p:attrName>style.visibility</p:attrName>
@@ -10616,257 +11539,14 @@
                                         <p:strVal val="visible"/>
                                       </p:to>
                                     </p:set>
-                                    <p:animEffect transition="in" filter="wipe(down)">
-                                      <p:cBhvr>
-                                        <p:cTn id="39" dur="580">
-                                          <p:stCondLst>
-                                            <p:cond delay="0"/>
-                                          </p:stCondLst>
-                                        </p:cTn>
-                                        <p:tgtEl>
-                                          <p:spTgt spid="4"/>
+                                    <p:animEffect transition="in" filter="fade">
+                                      <p:cBhvr>
+                                        <p:cTn id="13" dur="500"/>
+                                        <p:tgtEl>
+                                          <p:spTgt spid="6"/>
                                         </p:tgtEl>
                                       </p:cBhvr>
                                     </p:animEffect>
-                                    <p:anim calcmode="lin" valueType="num">
-                                      <p:cBhvr>
-                                        <p:cTn id="40" dur="1822" tmFilter="0,0; 0.14,0.36; 0.43,0.73; 0.71,0.91; 1.0,1.0">
-                                          <p:stCondLst>
-                                            <p:cond delay="0"/>
-                                          </p:stCondLst>
-                                        </p:cTn>
-                                        <p:tgtEl>
-                                          <p:spTgt spid="4"/>
-                                        </p:tgtEl>
-                                        <p:attrNameLst>
-                                          <p:attrName>ppt_x</p:attrName>
-                                        </p:attrNameLst>
-                                      </p:cBhvr>
-                                      <p:tavLst>
-                                        <p:tav tm="0">
-                                          <p:val>
-                                            <p:strVal val="#ppt_x-0.25"/>
-                                          </p:val>
-                                        </p:tav>
-                                        <p:tav tm="100000">
-                                          <p:val>
-                                            <p:strVal val="#ppt_x"/>
-                                          </p:val>
-                                        </p:tav>
-                                      </p:tavLst>
-                                    </p:anim>
-                                    <p:anim calcmode="lin" valueType="num">
-                                      <p:cBhvr>
-                                        <p:cTn id="41" dur="664" tmFilter="0.0,0.0; 0.25,0.07; 0.50,0.2; 0.75,0.467; 1.0,1.0">
-                                          <p:stCondLst>
-                                            <p:cond delay="0"/>
-                                          </p:stCondLst>
-                                        </p:cTn>
-                                        <p:tgtEl>
-                                          <p:spTgt spid="4"/>
-                                        </p:tgtEl>
-                                        <p:attrNameLst>
-                                          <p:attrName>ppt_y</p:attrName>
-                                        </p:attrNameLst>
-                                      </p:cBhvr>
-                                      <p:tavLst>
-                                        <p:tav tm="0" fmla="#ppt_y-sin(pi*$)/3">
-                                          <p:val>
-                                            <p:fltVal val="0.5"/>
-                                          </p:val>
-                                        </p:tav>
-                                        <p:tav tm="100000">
-                                          <p:val>
-                                            <p:fltVal val="1"/>
-                                          </p:val>
-                                        </p:tav>
-                                      </p:tavLst>
-                                    </p:anim>
-                                    <p:anim calcmode="lin" valueType="num">
-                                      <p:cBhvr>
-                                        <p:cTn id="42" dur="664" tmFilter="0, 0; 0.125,0.2665; 0.25,0.4; 0.375,0.465; 0.5,0.5;  0.625,0.535; 0.75,0.6; 0.875,0.7335; 1,1">
-                                          <p:stCondLst>
-                                            <p:cond delay="664"/>
-                                          </p:stCondLst>
-                                        </p:cTn>
-                                        <p:tgtEl>
-                                          <p:spTgt spid="4"/>
-                                        </p:tgtEl>
-                                        <p:attrNameLst>
-                                          <p:attrName>ppt_y</p:attrName>
-                                        </p:attrNameLst>
-                                      </p:cBhvr>
-                                      <p:tavLst>
-                                        <p:tav tm="0" fmla="#ppt_y-sin(pi*$)/9">
-                                          <p:val>
-                                            <p:fltVal val="0"/>
-                                          </p:val>
-                                        </p:tav>
-                                        <p:tav tm="100000">
-                                          <p:val>
-                                            <p:fltVal val="1"/>
-                                          </p:val>
-                                        </p:tav>
-                                      </p:tavLst>
-                                    </p:anim>
-                                    <p:anim calcmode="lin" valueType="num">
-                                      <p:cBhvr>
-                                        <p:cTn id="43" dur="332" tmFilter="0, 0; 0.125,0.2665; 0.25,0.4; 0.375,0.465; 0.5,0.5;  0.625,0.535; 0.75,0.6; 0.875,0.7335; 1,1">
-                                          <p:stCondLst>
-                                            <p:cond delay="1324"/>
-                                          </p:stCondLst>
-                                        </p:cTn>
-                                        <p:tgtEl>
-                                          <p:spTgt spid="4"/>
-                                        </p:tgtEl>
-                                        <p:attrNameLst>
-                                          <p:attrName>ppt_y</p:attrName>
-                                        </p:attrNameLst>
-                                      </p:cBhvr>
-                                      <p:tavLst>
-                                        <p:tav tm="0" fmla="#ppt_y-sin(pi*$)/27">
-                                          <p:val>
-                                            <p:fltVal val="0"/>
-                                          </p:val>
-                                        </p:tav>
-                                        <p:tav tm="100000">
-                                          <p:val>
-                                            <p:fltVal val="1"/>
-                                          </p:val>
-                                        </p:tav>
-                                      </p:tavLst>
-                                    </p:anim>
-                                    <p:anim calcmode="lin" valueType="num">
-                                      <p:cBhvr>
-                                        <p:cTn id="44" dur="164" tmFilter="0, 0; 0.125,0.2665; 0.25,0.4; 0.375,0.465; 0.5,0.5;  0.625,0.535; 0.75,0.6; 0.875,0.7335; 1,1">
-                                          <p:stCondLst>
-                                            <p:cond delay="1656"/>
-                                          </p:stCondLst>
-                                        </p:cTn>
-                                        <p:tgtEl>
-                                          <p:spTgt spid="4"/>
-                                        </p:tgtEl>
-                                        <p:attrNameLst>
-                                          <p:attrName>ppt_y</p:attrName>
-                                        </p:attrNameLst>
-                                      </p:cBhvr>
-                                      <p:tavLst>
-                                        <p:tav tm="0" fmla="#ppt_y-sin(pi*$)/81">
-                                          <p:val>
-                                            <p:fltVal val="0"/>
-                                          </p:val>
-                                        </p:tav>
-                                        <p:tav tm="100000">
-                                          <p:val>
-                                            <p:fltVal val="1"/>
-                                          </p:val>
-                                        </p:tav>
-                                      </p:tavLst>
-                                    </p:anim>
-                                    <p:animScale>
-                                      <p:cBhvr>
-                                        <p:cTn id="45" dur="26">
-                                          <p:stCondLst>
-                                            <p:cond delay="650"/>
-                                          </p:stCondLst>
-                                        </p:cTn>
-                                        <p:tgtEl>
-                                          <p:spTgt spid="4"/>
-                                        </p:tgtEl>
-                                      </p:cBhvr>
-                                      <p:to x="100000" y="60000"/>
-                                    </p:animScale>
-                                    <p:animScale>
-                                      <p:cBhvr>
-                                        <p:cTn id="46" dur="166" decel="50000">
-                                          <p:stCondLst>
-                                            <p:cond delay="676"/>
-                                          </p:stCondLst>
-                                        </p:cTn>
-                                        <p:tgtEl>
-                                          <p:spTgt spid="4"/>
-                                        </p:tgtEl>
-                                      </p:cBhvr>
-                                      <p:to x="100000" y="100000"/>
-                                    </p:animScale>
-                                    <p:animScale>
-                                      <p:cBhvr>
-                                        <p:cTn id="47" dur="26">
-                                          <p:stCondLst>
-                                            <p:cond delay="1312"/>
-                                          </p:stCondLst>
-                                        </p:cTn>
-                                        <p:tgtEl>
-                                          <p:spTgt spid="4"/>
-                                        </p:tgtEl>
-                                      </p:cBhvr>
-                                      <p:to x="100000" y="80000"/>
-                                    </p:animScale>
-                                    <p:animScale>
-                                      <p:cBhvr>
-                                        <p:cTn id="48" dur="166" decel="50000">
-                                          <p:stCondLst>
-                                            <p:cond delay="1338"/>
-                                          </p:stCondLst>
-                                        </p:cTn>
-                                        <p:tgtEl>
-                                          <p:spTgt spid="4"/>
-                                        </p:tgtEl>
-                                      </p:cBhvr>
-                                      <p:to x="100000" y="100000"/>
-                                    </p:animScale>
-                                    <p:animScale>
-                                      <p:cBhvr>
-                                        <p:cTn id="49" dur="26">
-                                          <p:stCondLst>
-                                            <p:cond delay="1642"/>
-                                          </p:stCondLst>
-                                        </p:cTn>
-                                        <p:tgtEl>
-                                          <p:spTgt spid="4"/>
-                                        </p:tgtEl>
-                                      </p:cBhvr>
-                                      <p:to x="100000" y="90000"/>
-                                    </p:animScale>
-                                    <p:animScale>
-                                      <p:cBhvr>
-                                        <p:cTn id="50" dur="166" decel="50000">
-                                          <p:stCondLst>
-                                            <p:cond delay="1668"/>
-                                          </p:stCondLst>
-                                        </p:cTn>
-                                        <p:tgtEl>
-                                          <p:spTgt spid="4"/>
-                                        </p:tgtEl>
-                                      </p:cBhvr>
-                                      <p:to x="100000" y="100000"/>
-                                    </p:animScale>
-                                    <p:animScale>
-                                      <p:cBhvr>
-                                        <p:cTn id="51" dur="26">
-                                          <p:stCondLst>
-                                            <p:cond delay="1808"/>
-                                          </p:stCondLst>
-                                        </p:cTn>
-                                        <p:tgtEl>
-                                          <p:spTgt spid="4"/>
-                                        </p:tgtEl>
-                                      </p:cBhvr>
-                                      <p:to x="100000" y="95000"/>
-                                    </p:animScale>
-                                    <p:animScale>
-                                      <p:cBhvr>
-                                        <p:cTn id="52" dur="166" decel="50000">
-                                          <p:stCondLst>
-                                            <p:cond delay="1834"/>
-                                          </p:stCondLst>
-                                        </p:cTn>
-                                        <p:tgtEl>
-                                          <p:spTgt spid="4"/>
-                                        </p:tgtEl>
-                                      </p:cBhvr>
-                                      <p:to x="100000" y="100000"/>
-                                    </p:animScale>
                                   </p:childTnLst>
                                 </p:cTn>
                               </p:par>
@@ -11226,6 +11906,1384 @@
                                         </p:tgtEl>
                                       </p:cBhvr>
                                     </p:animEffect>
+                                  </p:childTnLst>
+                                </p:cTn>
+                              </p:par>
+                            </p:childTnLst>
+                          </p:cTn>
+                        </p:par>
+                      </p:childTnLst>
+                    </p:cTn>
+                  </p:par>
+                </p:childTnLst>
+              </p:cTn>
+              <p:prevCondLst>
+                <p:cond evt="onPrev" delay="0">
+                  <p:tgtEl>
+                    <p:sldTgt/>
+                  </p:tgtEl>
+                </p:cond>
+              </p:prevCondLst>
+              <p:nextCondLst>
+                <p:cond evt="onNext" delay="0">
+                  <p:tgtEl>
+                    <p:sldTgt/>
+                  </p:tgtEl>
+                </p:cond>
+              </p:nextCondLst>
+            </p:seq>
+          </p:childTnLst>
+        </p:cTn>
+      </p:par>
+    </p:tnLst>
+    <p:bldLst>
+      <p:bldP spid="2" grpId="0"/>
+      <p:bldP spid="3" grpId="0" build="p"/>
+    </p:bldLst>
+  </p:timing>
+</p:sld>
+</file>
+
+<file path=ppt/slides/slide20.xml><?xml version="1.0" encoding="utf-8"?>
+<p:sld xmlns:a="http://schemas.openxmlformats.org/drawingml/2006/main" xmlns:r="http://schemas.openxmlformats.org/officeDocument/2006/relationships" xmlns:p="http://schemas.openxmlformats.org/presentationml/2006/main">
+  <p:cSld>
+    <p:spTree>
+      <p:nvGrpSpPr>
+        <p:cNvPr id="1" name=""/>
+        <p:cNvGrpSpPr/>
+        <p:nvPr/>
+      </p:nvGrpSpPr>
+      <p:grpSpPr>
+        <a:xfrm>
+          <a:off x="0" y="0"/>
+          <a:ext cx="0" cy="0"/>
+          <a:chOff x="0" y="0"/>
+          <a:chExt cx="0" cy="0"/>
+        </a:xfrm>
+      </p:grpSpPr>
+      <p:sp>
+        <p:nvSpPr>
+          <p:cNvPr id="2" name="Título 1"/>
+          <p:cNvSpPr>
+            <a:spLocks noGrp="1"/>
+          </p:cNvSpPr>
+          <p:nvPr>
+            <p:ph type="title"/>
+          </p:nvPr>
+        </p:nvSpPr>
+        <p:spPr>
+          <a:xfrm>
+            <a:off x="1197735" y="689998"/>
+            <a:ext cx="9826580" cy="997134"/>
+          </a:xfrm>
+        </p:spPr>
+        <p:txBody>
+          <a:bodyPr/>
+          <a:lstStyle/>
+          <a:p>
+            <a:r>
+              <a:rPr lang="pt-BR" sz="4400" b="1" dirty="0"/>
+              <a:t>Relação entre tabelas</a:t>
+            </a:r>
+            <a:endParaRPr lang="pt-BR" sz="4400" b="1" dirty="0"/>
+          </a:p>
+        </p:txBody>
+      </p:sp>
+      <p:pic>
+        <p:nvPicPr>
+          <p:cNvPr id="5" name="Imagem 4"/>
+          <p:cNvPicPr>
+            <a:picLocks noChangeAspect="1"/>
+          </p:cNvPicPr>
+          <p:nvPr/>
+        </p:nvPicPr>
+        <p:blipFill>
+          <a:blip r:embed="rId2"/>
+          <a:stretch>
+            <a:fillRect/>
+          </a:stretch>
+        </p:blipFill>
+        <p:spPr>
+          <a:xfrm>
+            <a:off x="1860092" y="1771071"/>
+            <a:ext cx="3361386" cy="1854558"/>
+          </a:xfrm>
+          <a:prstGeom prst="rect">
+            <a:avLst/>
+          </a:prstGeom>
+        </p:spPr>
+      </p:pic>
+      <p:pic>
+        <p:nvPicPr>
+          <p:cNvPr id="6" name="Imagem 5"/>
+          <p:cNvPicPr>
+            <a:picLocks noChangeAspect="1"/>
+          </p:cNvPicPr>
+          <p:nvPr/>
+        </p:nvPicPr>
+        <p:blipFill>
+          <a:blip r:embed="rId3"/>
+          <a:stretch>
+            <a:fillRect/>
+          </a:stretch>
+        </p:blipFill>
+        <p:spPr>
+          <a:xfrm>
+            <a:off x="1197735" y="3709568"/>
+            <a:ext cx="4686100" cy="2934052"/>
+          </a:xfrm>
+          <a:prstGeom prst="rect">
+            <a:avLst/>
+          </a:prstGeom>
+        </p:spPr>
+      </p:pic>
+      <p:pic>
+        <p:nvPicPr>
+          <p:cNvPr id="7" name="Imagem 6"/>
+          <p:cNvPicPr>
+            <a:picLocks noChangeAspect="1"/>
+          </p:cNvPicPr>
+          <p:nvPr/>
+        </p:nvPicPr>
+        <p:blipFill>
+          <a:blip r:embed="rId4"/>
+          <a:stretch>
+            <a:fillRect/>
+          </a:stretch>
+        </p:blipFill>
+        <p:spPr>
+          <a:xfrm>
+            <a:off x="6111025" y="2112134"/>
+            <a:ext cx="5462165" cy="3704957"/>
+          </a:xfrm>
+          <a:prstGeom prst="rect">
+            <a:avLst/>
+          </a:prstGeom>
+        </p:spPr>
+      </p:pic>
+    </p:spTree>
+    <p:extLst>
+      <p:ext uri="{BB962C8B-B14F-4D97-AF65-F5344CB8AC3E}">
+        <p14:creationId xmlns:p14="http://schemas.microsoft.com/office/powerpoint/2010/main" val="1633994351"/>
+      </p:ext>
+    </p:extLst>
+  </p:cSld>
+  <p:clrMapOvr>
+    <a:masterClrMapping/>
+  </p:clrMapOvr>
+  <p:timing>
+    <p:tnLst>
+      <p:par>
+        <p:cTn id="1" dur="indefinite" restart="never" nodeType="tmRoot">
+          <p:childTnLst>
+            <p:seq concurrent="1" nextAc="seek">
+              <p:cTn id="2" dur="indefinite" nodeType="mainSeq">
+                <p:childTnLst>
+                  <p:par>
+                    <p:cTn id="3" fill="hold">
+                      <p:stCondLst>
+                        <p:cond delay="indefinite"/>
+                      </p:stCondLst>
+                      <p:childTnLst>
+                        <p:par>
+                          <p:cTn id="4" fill="hold">
+                            <p:stCondLst>
+                              <p:cond delay="0"/>
+                            </p:stCondLst>
+                            <p:childTnLst>
+                              <p:par>
+                                <p:cTn id="5" presetID="10" presetClass="entr" presetSubtype="0" fill="hold" grpId="0" nodeType="clickEffect">
+                                  <p:stCondLst>
+                                    <p:cond delay="0"/>
+                                  </p:stCondLst>
+                                  <p:childTnLst>
+                                    <p:set>
+                                      <p:cBhvr>
+                                        <p:cTn id="6" dur="1" fill="hold">
+                                          <p:stCondLst>
+                                            <p:cond delay="0"/>
+                                          </p:stCondLst>
+                                        </p:cTn>
+                                        <p:tgtEl>
+                                          <p:spTgt spid="2"/>
+                                        </p:tgtEl>
+                                        <p:attrNameLst>
+                                          <p:attrName>style.visibility</p:attrName>
+                                        </p:attrNameLst>
+                                      </p:cBhvr>
+                                      <p:to>
+                                        <p:strVal val="visible"/>
+                                      </p:to>
+                                    </p:set>
+                                    <p:animEffect transition="in" filter="fade">
+                                      <p:cBhvr>
+                                        <p:cTn id="7" dur="500"/>
+                                        <p:tgtEl>
+                                          <p:spTgt spid="2"/>
+                                        </p:tgtEl>
+                                      </p:cBhvr>
+                                    </p:animEffect>
+                                  </p:childTnLst>
+                                </p:cTn>
+                              </p:par>
+                              <p:par>
+                                <p:cTn id="8" presetID="10" presetClass="entr" presetSubtype="0" fill="hold" nodeType="withEffect">
+                                  <p:stCondLst>
+                                    <p:cond delay="0"/>
+                                  </p:stCondLst>
+                                  <p:childTnLst>
+                                    <p:set>
+                                      <p:cBhvr>
+                                        <p:cTn id="9" dur="1" fill="hold">
+                                          <p:stCondLst>
+                                            <p:cond delay="0"/>
+                                          </p:stCondLst>
+                                        </p:cTn>
+                                        <p:tgtEl>
+                                          <p:spTgt spid="5"/>
+                                        </p:tgtEl>
+                                        <p:attrNameLst>
+                                          <p:attrName>style.visibility</p:attrName>
+                                        </p:attrNameLst>
+                                      </p:cBhvr>
+                                      <p:to>
+                                        <p:strVal val="visible"/>
+                                      </p:to>
+                                    </p:set>
+                                    <p:animEffect transition="in" filter="fade">
+                                      <p:cBhvr>
+                                        <p:cTn id="10" dur="500"/>
+                                        <p:tgtEl>
+                                          <p:spTgt spid="5"/>
+                                        </p:tgtEl>
+                                      </p:cBhvr>
+                                    </p:animEffect>
+                                  </p:childTnLst>
+                                </p:cTn>
+                              </p:par>
+                              <p:par>
+                                <p:cTn id="11" presetID="10" presetClass="entr" presetSubtype="0" fill="hold" nodeType="withEffect">
+                                  <p:stCondLst>
+                                    <p:cond delay="0"/>
+                                  </p:stCondLst>
+                                  <p:childTnLst>
+                                    <p:set>
+                                      <p:cBhvr>
+                                        <p:cTn id="12" dur="1" fill="hold">
+                                          <p:stCondLst>
+                                            <p:cond delay="0"/>
+                                          </p:stCondLst>
+                                        </p:cTn>
+                                        <p:tgtEl>
+                                          <p:spTgt spid="6"/>
+                                        </p:tgtEl>
+                                        <p:attrNameLst>
+                                          <p:attrName>style.visibility</p:attrName>
+                                        </p:attrNameLst>
+                                      </p:cBhvr>
+                                      <p:to>
+                                        <p:strVal val="visible"/>
+                                      </p:to>
+                                    </p:set>
+                                    <p:animEffect transition="in" filter="fade">
+                                      <p:cBhvr>
+                                        <p:cTn id="13" dur="500"/>
+                                        <p:tgtEl>
+                                          <p:spTgt spid="6"/>
+                                        </p:tgtEl>
+                                      </p:cBhvr>
+                                    </p:animEffect>
+                                  </p:childTnLst>
+                                </p:cTn>
+                              </p:par>
+                              <p:par>
+                                <p:cTn id="14" presetID="10" presetClass="entr" presetSubtype="0" fill="hold" nodeType="withEffect">
+                                  <p:stCondLst>
+                                    <p:cond delay="0"/>
+                                  </p:stCondLst>
+                                  <p:childTnLst>
+                                    <p:set>
+                                      <p:cBhvr>
+                                        <p:cTn id="15" dur="1" fill="hold">
+                                          <p:stCondLst>
+                                            <p:cond delay="0"/>
+                                          </p:stCondLst>
+                                        </p:cTn>
+                                        <p:tgtEl>
+                                          <p:spTgt spid="7"/>
+                                        </p:tgtEl>
+                                        <p:attrNameLst>
+                                          <p:attrName>style.visibility</p:attrName>
+                                        </p:attrNameLst>
+                                      </p:cBhvr>
+                                      <p:to>
+                                        <p:strVal val="visible"/>
+                                      </p:to>
+                                    </p:set>
+                                    <p:animEffect transition="in" filter="fade">
+                                      <p:cBhvr>
+                                        <p:cTn id="16" dur="500"/>
+                                        <p:tgtEl>
+                                          <p:spTgt spid="7"/>
+                                        </p:tgtEl>
+                                      </p:cBhvr>
+                                    </p:animEffect>
+                                  </p:childTnLst>
+                                </p:cTn>
+                              </p:par>
+                            </p:childTnLst>
+                          </p:cTn>
+                        </p:par>
+                      </p:childTnLst>
+                    </p:cTn>
+                  </p:par>
+                </p:childTnLst>
+              </p:cTn>
+              <p:prevCondLst>
+                <p:cond evt="onPrev" delay="0">
+                  <p:tgtEl>
+                    <p:sldTgt/>
+                  </p:tgtEl>
+                </p:cond>
+              </p:prevCondLst>
+              <p:nextCondLst>
+                <p:cond evt="onNext" delay="0">
+                  <p:tgtEl>
+                    <p:sldTgt/>
+                  </p:tgtEl>
+                </p:cond>
+              </p:nextCondLst>
+            </p:seq>
+          </p:childTnLst>
+        </p:cTn>
+      </p:par>
+    </p:tnLst>
+    <p:bldLst>
+      <p:bldP spid="2" grpId="0"/>
+    </p:bldLst>
+  </p:timing>
+</p:sld>
+</file>
+
+<file path=ppt/slides/slide21.xml><?xml version="1.0" encoding="utf-8"?>
+<p:sld xmlns:a="http://schemas.openxmlformats.org/drawingml/2006/main" xmlns:r="http://schemas.openxmlformats.org/officeDocument/2006/relationships" xmlns:p="http://schemas.openxmlformats.org/presentationml/2006/main">
+  <p:cSld>
+    <p:spTree>
+      <p:nvGrpSpPr>
+        <p:cNvPr id="1" name=""/>
+        <p:cNvGrpSpPr/>
+        <p:nvPr/>
+      </p:nvGrpSpPr>
+      <p:grpSpPr>
+        <a:xfrm>
+          <a:off x="0" y="0"/>
+          <a:ext cx="0" cy="0"/>
+          <a:chOff x="0" y="0"/>
+          <a:chExt cx="0" cy="0"/>
+        </a:xfrm>
+      </p:grpSpPr>
+      <p:sp>
+        <p:nvSpPr>
+          <p:cNvPr id="2" name="Título 1"/>
+          <p:cNvSpPr>
+            <a:spLocks noGrp="1"/>
+          </p:cNvSpPr>
+          <p:nvPr>
+            <p:ph type="title"/>
+          </p:nvPr>
+        </p:nvSpPr>
+        <p:spPr>
+          <a:xfrm>
+            <a:off x="2498501" y="741514"/>
+            <a:ext cx="8384145" cy="4029130"/>
+          </a:xfrm>
+        </p:spPr>
+        <p:txBody>
+          <a:bodyPr/>
+          <a:lstStyle/>
+          <a:p>
+            <a:r>
+              <a:rPr lang="pt-BR" sz="9600" b="1" dirty="0" smtClean="0"/>
+              <a:t>OBRIGADO</a:t>
+            </a:r>
+            <a:endParaRPr lang="pt-BR" sz="9600" b="1" dirty="0"/>
+          </a:p>
+        </p:txBody>
+      </p:sp>
+      <p:sp>
+        <p:nvSpPr>
+          <p:cNvPr id="3" name="Espaço Reservado para Conteúdo 2"/>
+          <p:cNvSpPr>
+            <a:spLocks noGrp="1"/>
+          </p:cNvSpPr>
+          <p:nvPr>
+            <p:ph idx="1"/>
+          </p:nvPr>
+        </p:nvSpPr>
+        <p:spPr>
+          <a:xfrm>
+            <a:off x="8487177" y="2756079"/>
+            <a:ext cx="2550017" cy="3492320"/>
+          </a:xfrm>
+        </p:spPr>
+        <p:txBody>
+          <a:bodyPr/>
+          <a:lstStyle/>
+          <a:p>
+            <a:endParaRPr lang="pt-BR" dirty="0"/>
+          </a:p>
+        </p:txBody>
+      </p:sp>
+      <p:pic>
+        <p:nvPicPr>
+          <p:cNvPr id="4" name="Imagem 3"/>
+          <p:cNvPicPr>
+            <a:picLocks noChangeAspect="1"/>
+          </p:cNvPicPr>
+          <p:nvPr/>
+        </p:nvPicPr>
+        <p:blipFill>
+          <a:blip r:embed="rId2"/>
+          <a:stretch>
+            <a:fillRect/>
+          </a:stretch>
+        </p:blipFill>
+        <p:spPr>
+          <a:xfrm>
+            <a:off x="3515935" y="2252614"/>
+            <a:ext cx="4520484" cy="3995785"/>
+          </a:xfrm>
+          <a:prstGeom prst="rect">
+            <a:avLst/>
+          </a:prstGeom>
+        </p:spPr>
+      </p:pic>
+    </p:spTree>
+    <p:extLst>
+      <p:ext uri="{BB962C8B-B14F-4D97-AF65-F5344CB8AC3E}">
+        <p14:creationId xmlns:p14="http://schemas.microsoft.com/office/powerpoint/2010/main" val="2816668587"/>
+      </p:ext>
+    </p:extLst>
+  </p:cSld>
+  <p:clrMapOvr>
+    <a:masterClrMapping/>
+  </p:clrMapOvr>
+  <p:timing>
+    <p:tnLst>
+      <p:par>
+        <p:cTn id="1" dur="indefinite" restart="never" nodeType="tmRoot">
+          <p:childTnLst>
+            <p:seq concurrent="1" nextAc="seek">
+              <p:cTn id="2" dur="indefinite" nodeType="mainSeq">
+                <p:childTnLst>
+                  <p:par>
+                    <p:cTn id="3" fill="hold">
+                      <p:stCondLst>
+                        <p:cond delay="indefinite"/>
+                      </p:stCondLst>
+                      <p:childTnLst>
+                        <p:par>
+                          <p:cTn id="4" fill="hold">
+                            <p:stCondLst>
+                              <p:cond delay="0"/>
+                            </p:stCondLst>
+                            <p:childTnLst>
+                              <p:par>
+                                <p:cTn id="5" presetID="26" presetClass="entr" presetSubtype="0" fill="hold" grpId="0" nodeType="clickEffect">
+                                  <p:stCondLst>
+                                    <p:cond delay="0"/>
+                                  </p:stCondLst>
+                                  <p:childTnLst>
+                                    <p:set>
+                                      <p:cBhvr>
+                                        <p:cTn id="6" dur="1" fill="hold">
+                                          <p:stCondLst>
+                                            <p:cond delay="0"/>
+                                          </p:stCondLst>
+                                        </p:cTn>
+                                        <p:tgtEl>
+                                          <p:spTgt spid="2"/>
+                                        </p:tgtEl>
+                                        <p:attrNameLst>
+                                          <p:attrName>style.visibility</p:attrName>
+                                        </p:attrNameLst>
+                                      </p:cBhvr>
+                                      <p:to>
+                                        <p:strVal val="visible"/>
+                                      </p:to>
+                                    </p:set>
+                                    <p:animEffect transition="in" filter="wipe(down)">
+                                      <p:cBhvr>
+                                        <p:cTn id="7" dur="580">
+                                          <p:stCondLst>
+                                            <p:cond delay="0"/>
+                                          </p:stCondLst>
+                                        </p:cTn>
+                                        <p:tgtEl>
+                                          <p:spTgt spid="2"/>
+                                        </p:tgtEl>
+                                      </p:cBhvr>
+                                    </p:animEffect>
+                                    <p:anim calcmode="lin" valueType="num">
+                                      <p:cBhvr>
+                                        <p:cTn id="8" dur="1822" tmFilter="0,0; 0.14,0.36; 0.43,0.73; 0.71,0.91; 1.0,1.0">
+                                          <p:stCondLst>
+                                            <p:cond delay="0"/>
+                                          </p:stCondLst>
+                                        </p:cTn>
+                                        <p:tgtEl>
+                                          <p:spTgt spid="2"/>
+                                        </p:tgtEl>
+                                        <p:attrNameLst>
+                                          <p:attrName>ppt_x</p:attrName>
+                                        </p:attrNameLst>
+                                      </p:cBhvr>
+                                      <p:tavLst>
+                                        <p:tav tm="0">
+                                          <p:val>
+                                            <p:strVal val="#ppt_x-0.25"/>
+                                          </p:val>
+                                        </p:tav>
+                                        <p:tav tm="100000">
+                                          <p:val>
+                                            <p:strVal val="#ppt_x"/>
+                                          </p:val>
+                                        </p:tav>
+                                      </p:tavLst>
+                                    </p:anim>
+                                    <p:anim calcmode="lin" valueType="num">
+                                      <p:cBhvr>
+                                        <p:cTn id="9" dur="664" tmFilter="0.0,0.0; 0.25,0.07; 0.50,0.2; 0.75,0.467; 1.0,1.0">
+                                          <p:stCondLst>
+                                            <p:cond delay="0"/>
+                                          </p:stCondLst>
+                                        </p:cTn>
+                                        <p:tgtEl>
+                                          <p:spTgt spid="2"/>
+                                        </p:tgtEl>
+                                        <p:attrNameLst>
+                                          <p:attrName>ppt_y</p:attrName>
+                                        </p:attrNameLst>
+                                      </p:cBhvr>
+                                      <p:tavLst>
+                                        <p:tav tm="0" fmla="#ppt_y-sin(pi*$)/3">
+                                          <p:val>
+                                            <p:fltVal val="0.5"/>
+                                          </p:val>
+                                        </p:tav>
+                                        <p:tav tm="100000">
+                                          <p:val>
+                                            <p:fltVal val="1"/>
+                                          </p:val>
+                                        </p:tav>
+                                      </p:tavLst>
+                                    </p:anim>
+                                    <p:anim calcmode="lin" valueType="num">
+                                      <p:cBhvr>
+                                        <p:cTn id="10" dur="664" tmFilter="0, 0; 0.125,0.2665; 0.25,0.4; 0.375,0.465; 0.5,0.5;  0.625,0.535; 0.75,0.6; 0.875,0.7335; 1,1">
+                                          <p:stCondLst>
+                                            <p:cond delay="664"/>
+                                          </p:stCondLst>
+                                        </p:cTn>
+                                        <p:tgtEl>
+                                          <p:spTgt spid="2"/>
+                                        </p:tgtEl>
+                                        <p:attrNameLst>
+                                          <p:attrName>ppt_y</p:attrName>
+                                        </p:attrNameLst>
+                                      </p:cBhvr>
+                                      <p:tavLst>
+                                        <p:tav tm="0" fmla="#ppt_y-sin(pi*$)/9">
+                                          <p:val>
+                                            <p:fltVal val="0"/>
+                                          </p:val>
+                                        </p:tav>
+                                        <p:tav tm="100000">
+                                          <p:val>
+                                            <p:fltVal val="1"/>
+                                          </p:val>
+                                        </p:tav>
+                                      </p:tavLst>
+                                    </p:anim>
+                                    <p:anim calcmode="lin" valueType="num">
+                                      <p:cBhvr>
+                                        <p:cTn id="11" dur="332" tmFilter="0, 0; 0.125,0.2665; 0.25,0.4; 0.375,0.465; 0.5,0.5;  0.625,0.535; 0.75,0.6; 0.875,0.7335; 1,1">
+                                          <p:stCondLst>
+                                            <p:cond delay="1324"/>
+                                          </p:stCondLst>
+                                        </p:cTn>
+                                        <p:tgtEl>
+                                          <p:spTgt spid="2"/>
+                                        </p:tgtEl>
+                                        <p:attrNameLst>
+                                          <p:attrName>ppt_y</p:attrName>
+                                        </p:attrNameLst>
+                                      </p:cBhvr>
+                                      <p:tavLst>
+                                        <p:tav tm="0" fmla="#ppt_y-sin(pi*$)/27">
+                                          <p:val>
+                                            <p:fltVal val="0"/>
+                                          </p:val>
+                                        </p:tav>
+                                        <p:tav tm="100000">
+                                          <p:val>
+                                            <p:fltVal val="1"/>
+                                          </p:val>
+                                        </p:tav>
+                                      </p:tavLst>
+                                    </p:anim>
+                                    <p:anim calcmode="lin" valueType="num">
+                                      <p:cBhvr>
+                                        <p:cTn id="12" dur="164" tmFilter="0, 0; 0.125,0.2665; 0.25,0.4; 0.375,0.465; 0.5,0.5;  0.625,0.535; 0.75,0.6; 0.875,0.7335; 1,1">
+                                          <p:stCondLst>
+                                            <p:cond delay="1656"/>
+                                          </p:stCondLst>
+                                        </p:cTn>
+                                        <p:tgtEl>
+                                          <p:spTgt spid="2"/>
+                                        </p:tgtEl>
+                                        <p:attrNameLst>
+                                          <p:attrName>ppt_y</p:attrName>
+                                        </p:attrNameLst>
+                                      </p:cBhvr>
+                                      <p:tavLst>
+                                        <p:tav tm="0" fmla="#ppt_y-sin(pi*$)/81">
+                                          <p:val>
+                                            <p:fltVal val="0"/>
+                                          </p:val>
+                                        </p:tav>
+                                        <p:tav tm="100000">
+                                          <p:val>
+                                            <p:fltVal val="1"/>
+                                          </p:val>
+                                        </p:tav>
+                                      </p:tavLst>
+                                    </p:anim>
+                                    <p:animScale>
+                                      <p:cBhvr>
+                                        <p:cTn id="13" dur="26">
+                                          <p:stCondLst>
+                                            <p:cond delay="650"/>
+                                          </p:stCondLst>
+                                        </p:cTn>
+                                        <p:tgtEl>
+                                          <p:spTgt spid="2"/>
+                                        </p:tgtEl>
+                                      </p:cBhvr>
+                                      <p:to x="100000" y="60000"/>
+                                    </p:animScale>
+                                    <p:animScale>
+                                      <p:cBhvr>
+                                        <p:cTn id="14" dur="166" decel="50000">
+                                          <p:stCondLst>
+                                            <p:cond delay="676"/>
+                                          </p:stCondLst>
+                                        </p:cTn>
+                                        <p:tgtEl>
+                                          <p:spTgt spid="2"/>
+                                        </p:tgtEl>
+                                      </p:cBhvr>
+                                      <p:to x="100000" y="100000"/>
+                                    </p:animScale>
+                                    <p:animScale>
+                                      <p:cBhvr>
+                                        <p:cTn id="15" dur="26">
+                                          <p:stCondLst>
+                                            <p:cond delay="1312"/>
+                                          </p:stCondLst>
+                                        </p:cTn>
+                                        <p:tgtEl>
+                                          <p:spTgt spid="2"/>
+                                        </p:tgtEl>
+                                      </p:cBhvr>
+                                      <p:to x="100000" y="80000"/>
+                                    </p:animScale>
+                                    <p:animScale>
+                                      <p:cBhvr>
+                                        <p:cTn id="16" dur="166" decel="50000">
+                                          <p:stCondLst>
+                                            <p:cond delay="1338"/>
+                                          </p:stCondLst>
+                                        </p:cTn>
+                                        <p:tgtEl>
+                                          <p:spTgt spid="2"/>
+                                        </p:tgtEl>
+                                      </p:cBhvr>
+                                      <p:to x="100000" y="100000"/>
+                                    </p:animScale>
+                                    <p:animScale>
+                                      <p:cBhvr>
+                                        <p:cTn id="17" dur="26">
+                                          <p:stCondLst>
+                                            <p:cond delay="1642"/>
+                                          </p:stCondLst>
+                                        </p:cTn>
+                                        <p:tgtEl>
+                                          <p:spTgt spid="2"/>
+                                        </p:tgtEl>
+                                      </p:cBhvr>
+                                      <p:to x="100000" y="90000"/>
+                                    </p:animScale>
+                                    <p:animScale>
+                                      <p:cBhvr>
+                                        <p:cTn id="18" dur="166" decel="50000">
+                                          <p:stCondLst>
+                                            <p:cond delay="1668"/>
+                                          </p:stCondLst>
+                                        </p:cTn>
+                                        <p:tgtEl>
+                                          <p:spTgt spid="2"/>
+                                        </p:tgtEl>
+                                      </p:cBhvr>
+                                      <p:to x="100000" y="100000"/>
+                                    </p:animScale>
+                                    <p:animScale>
+                                      <p:cBhvr>
+                                        <p:cTn id="19" dur="26">
+                                          <p:stCondLst>
+                                            <p:cond delay="1808"/>
+                                          </p:stCondLst>
+                                        </p:cTn>
+                                        <p:tgtEl>
+                                          <p:spTgt spid="2"/>
+                                        </p:tgtEl>
+                                      </p:cBhvr>
+                                      <p:to x="100000" y="95000"/>
+                                    </p:animScale>
+                                    <p:animScale>
+                                      <p:cBhvr>
+                                        <p:cTn id="20" dur="166" decel="50000">
+                                          <p:stCondLst>
+                                            <p:cond delay="1834"/>
+                                          </p:stCondLst>
+                                        </p:cTn>
+                                        <p:tgtEl>
+                                          <p:spTgt spid="2"/>
+                                        </p:tgtEl>
+                                      </p:cBhvr>
+                                      <p:to x="100000" y="100000"/>
+                                    </p:animScale>
+                                  </p:childTnLst>
+                                </p:cTn>
+                              </p:par>
+                              <p:par>
+                                <p:cTn id="21" presetID="26" presetClass="entr" presetSubtype="0" fill="hold" grpId="0" nodeType="withEffect" nodePh="1">
+                                  <p:stCondLst>
+                                    <p:cond delay="0"/>
+                                  </p:stCondLst>
+                                  <p:endCondLst>
+                                    <p:cond evt="begin" delay="0">
+                                      <p:tn val="21"/>
+                                    </p:cond>
+                                  </p:endCondLst>
+                                  <p:childTnLst>
+                                    <p:set>
+                                      <p:cBhvr>
+                                        <p:cTn id="22" dur="1" fill="hold">
+                                          <p:stCondLst>
+                                            <p:cond delay="0"/>
+                                          </p:stCondLst>
+                                        </p:cTn>
+                                        <p:tgtEl>
+                                          <p:spTgt spid="3">
+                                            <p:txEl>
+                                              <p:pRg st="0" end="0"/>
+                                            </p:txEl>
+                                          </p:spTgt>
+                                        </p:tgtEl>
+                                        <p:attrNameLst>
+                                          <p:attrName>style.visibility</p:attrName>
+                                        </p:attrNameLst>
+                                      </p:cBhvr>
+                                      <p:to>
+                                        <p:strVal val="visible"/>
+                                      </p:to>
+                                    </p:set>
+                                    <p:animEffect transition="in" filter="wipe(down)">
+                                      <p:cBhvr>
+                                        <p:cTn id="23" dur="580">
+                                          <p:stCondLst>
+                                            <p:cond delay="0"/>
+                                          </p:stCondLst>
+                                        </p:cTn>
+                                        <p:tgtEl>
+                                          <p:spTgt spid="3">
+                                            <p:txEl>
+                                              <p:pRg st="0" end="0"/>
+                                            </p:txEl>
+                                          </p:spTgt>
+                                        </p:tgtEl>
+                                      </p:cBhvr>
+                                    </p:animEffect>
+                                    <p:anim calcmode="lin" valueType="num">
+                                      <p:cBhvr>
+                                        <p:cTn id="24" dur="1822" tmFilter="0,0; 0.14,0.36; 0.43,0.73; 0.71,0.91; 1.0,1.0">
+                                          <p:stCondLst>
+                                            <p:cond delay="0"/>
+                                          </p:stCondLst>
+                                        </p:cTn>
+                                        <p:tgtEl>
+                                          <p:spTgt spid="3">
+                                            <p:txEl>
+                                              <p:pRg st="0" end="0"/>
+                                            </p:txEl>
+                                          </p:spTgt>
+                                        </p:tgtEl>
+                                        <p:attrNameLst>
+                                          <p:attrName>ppt_x</p:attrName>
+                                        </p:attrNameLst>
+                                      </p:cBhvr>
+                                      <p:tavLst>
+                                        <p:tav tm="0">
+                                          <p:val>
+                                            <p:strVal val="#ppt_x-0.25"/>
+                                          </p:val>
+                                        </p:tav>
+                                        <p:tav tm="100000">
+                                          <p:val>
+                                            <p:strVal val="#ppt_x"/>
+                                          </p:val>
+                                        </p:tav>
+                                      </p:tavLst>
+                                    </p:anim>
+                                    <p:anim calcmode="lin" valueType="num">
+                                      <p:cBhvr>
+                                        <p:cTn id="25" dur="664" tmFilter="0.0,0.0; 0.25,0.07; 0.50,0.2; 0.75,0.467; 1.0,1.0">
+                                          <p:stCondLst>
+                                            <p:cond delay="0"/>
+                                          </p:stCondLst>
+                                        </p:cTn>
+                                        <p:tgtEl>
+                                          <p:spTgt spid="3">
+                                            <p:txEl>
+                                              <p:pRg st="0" end="0"/>
+                                            </p:txEl>
+                                          </p:spTgt>
+                                        </p:tgtEl>
+                                        <p:attrNameLst>
+                                          <p:attrName>ppt_y</p:attrName>
+                                        </p:attrNameLst>
+                                      </p:cBhvr>
+                                      <p:tavLst>
+                                        <p:tav tm="0" fmla="#ppt_y-sin(pi*$)/3">
+                                          <p:val>
+                                            <p:fltVal val="0.5"/>
+                                          </p:val>
+                                        </p:tav>
+                                        <p:tav tm="100000">
+                                          <p:val>
+                                            <p:fltVal val="1"/>
+                                          </p:val>
+                                        </p:tav>
+                                      </p:tavLst>
+                                    </p:anim>
+                                    <p:anim calcmode="lin" valueType="num">
+                                      <p:cBhvr>
+                                        <p:cTn id="26" dur="664" tmFilter="0, 0; 0.125,0.2665; 0.25,0.4; 0.375,0.465; 0.5,0.5;  0.625,0.535; 0.75,0.6; 0.875,0.7335; 1,1">
+                                          <p:stCondLst>
+                                            <p:cond delay="664"/>
+                                          </p:stCondLst>
+                                        </p:cTn>
+                                        <p:tgtEl>
+                                          <p:spTgt spid="3">
+                                            <p:txEl>
+                                              <p:pRg st="0" end="0"/>
+                                            </p:txEl>
+                                          </p:spTgt>
+                                        </p:tgtEl>
+                                        <p:attrNameLst>
+                                          <p:attrName>ppt_y</p:attrName>
+                                        </p:attrNameLst>
+                                      </p:cBhvr>
+                                      <p:tavLst>
+                                        <p:tav tm="0" fmla="#ppt_y-sin(pi*$)/9">
+                                          <p:val>
+                                            <p:fltVal val="0"/>
+                                          </p:val>
+                                        </p:tav>
+                                        <p:tav tm="100000">
+                                          <p:val>
+                                            <p:fltVal val="1"/>
+                                          </p:val>
+                                        </p:tav>
+                                      </p:tavLst>
+                                    </p:anim>
+                                    <p:anim calcmode="lin" valueType="num">
+                                      <p:cBhvr>
+                                        <p:cTn id="27" dur="332" tmFilter="0, 0; 0.125,0.2665; 0.25,0.4; 0.375,0.465; 0.5,0.5;  0.625,0.535; 0.75,0.6; 0.875,0.7335; 1,1">
+                                          <p:stCondLst>
+                                            <p:cond delay="1324"/>
+                                          </p:stCondLst>
+                                        </p:cTn>
+                                        <p:tgtEl>
+                                          <p:spTgt spid="3">
+                                            <p:txEl>
+                                              <p:pRg st="0" end="0"/>
+                                            </p:txEl>
+                                          </p:spTgt>
+                                        </p:tgtEl>
+                                        <p:attrNameLst>
+                                          <p:attrName>ppt_y</p:attrName>
+                                        </p:attrNameLst>
+                                      </p:cBhvr>
+                                      <p:tavLst>
+                                        <p:tav tm="0" fmla="#ppt_y-sin(pi*$)/27">
+                                          <p:val>
+                                            <p:fltVal val="0"/>
+                                          </p:val>
+                                        </p:tav>
+                                        <p:tav tm="100000">
+                                          <p:val>
+                                            <p:fltVal val="1"/>
+                                          </p:val>
+                                        </p:tav>
+                                      </p:tavLst>
+                                    </p:anim>
+                                    <p:anim calcmode="lin" valueType="num">
+                                      <p:cBhvr>
+                                        <p:cTn id="28" dur="164" tmFilter="0, 0; 0.125,0.2665; 0.25,0.4; 0.375,0.465; 0.5,0.5;  0.625,0.535; 0.75,0.6; 0.875,0.7335; 1,1">
+                                          <p:stCondLst>
+                                            <p:cond delay="1656"/>
+                                          </p:stCondLst>
+                                        </p:cTn>
+                                        <p:tgtEl>
+                                          <p:spTgt spid="3">
+                                            <p:txEl>
+                                              <p:pRg st="0" end="0"/>
+                                            </p:txEl>
+                                          </p:spTgt>
+                                        </p:tgtEl>
+                                        <p:attrNameLst>
+                                          <p:attrName>ppt_y</p:attrName>
+                                        </p:attrNameLst>
+                                      </p:cBhvr>
+                                      <p:tavLst>
+                                        <p:tav tm="0" fmla="#ppt_y-sin(pi*$)/81">
+                                          <p:val>
+                                            <p:fltVal val="0"/>
+                                          </p:val>
+                                        </p:tav>
+                                        <p:tav tm="100000">
+                                          <p:val>
+                                            <p:fltVal val="1"/>
+                                          </p:val>
+                                        </p:tav>
+                                      </p:tavLst>
+                                    </p:anim>
+                                    <p:animScale>
+                                      <p:cBhvr>
+                                        <p:cTn id="29" dur="26">
+                                          <p:stCondLst>
+                                            <p:cond delay="650"/>
+                                          </p:stCondLst>
+                                        </p:cTn>
+                                        <p:tgtEl>
+                                          <p:spTgt spid="3">
+                                            <p:txEl>
+                                              <p:pRg st="0" end="0"/>
+                                            </p:txEl>
+                                          </p:spTgt>
+                                        </p:tgtEl>
+                                      </p:cBhvr>
+                                      <p:to x="100000" y="60000"/>
+                                    </p:animScale>
+                                    <p:animScale>
+                                      <p:cBhvr>
+                                        <p:cTn id="30" dur="166" decel="50000">
+                                          <p:stCondLst>
+                                            <p:cond delay="676"/>
+                                          </p:stCondLst>
+                                        </p:cTn>
+                                        <p:tgtEl>
+                                          <p:spTgt spid="3">
+                                            <p:txEl>
+                                              <p:pRg st="0" end="0"/>
+                                            </p:txEl>
+                                          </p:spTgt>
+                                        </p:tgtEl>
+                                      </p:cBhvr>
+                                      <p:to x="100000" y="100000"/>
+                                    </p:animScale>
+                                    <p:animScale>
+                                      <p:cBhvr>
+                                        <p:cTn id="31" dur="26">
+                                          <p:stCondLst>
+                                            <p:cond delay="1312"/>
+                                          </p:stCondLst>
+                                        </p:cTn>
+                                        <p:tgtEl>
+                                          <p:spTgt spid="3">
+                                            <p:txEl>
+                                              <p:pRg st="0" end="0"/>
+                                            </p:txEl>
+                                          </p:spTgt>
+                                        </p:tgtEl>
+                                      </p:cBhvr>
+                                      <p:to x="100000" y="80000"/>
+                                    </p:animScale>
+                                    <p:animScale>
+                                      <p:cBhvr>
+                                        <p:cTn id="32" dur="166" decel="50000">
+                                          <p:stCondLst>
+                                            <p:cond delay="1338"/>
+                                          </p:stCondLst>
+                                        </p:cTn>
+                                        <p:tgtEl>
+                                          <p:spTgt spid="3">
+                                            <p:txEl>
+                                              <p:pRg st="0" end="0"/>
+                                            </p:txEl>
+                                          </p:spTgt>
+                                        </p:tgtEl>
+                                      </p:cBhvr>
+                                      <p:to x="100000" y="100000"/>
+                                    </p:animScale>
+                                    <p:animScale>
+                                      <p:cBhvr>
+                                        <p:cTn id="33" dur="26">
+                                          <p:stCondLst>
+                                            <p:cond delay="1642"/>
+                                          </p:stCondLst>
+                                        </p:cTn>
+                                        <p:tgtEl>
+                                          <p:spTgt spid="3">
+                                            <p:txEl>
+                                              <p:pRg st="0" end="0"/>
+                                            </p:txEl>
+                                          </p:spTgt>
+                                        </p:tgtEl>
+                                      </p:cBhvr>
+                                      <p:to x="100000" y="90000"/>
+                                    </p:animScale>
+                                    <p:animScale>
+                                      <p:cBhvr>
+                                        <p:cTn id="34" dur="166" decel="50000">
+                                          <p:stCondLst>
+                                            <p:cond delay="1668"/>
+                                          </p:stCondLst>
+                                        </p:cTn>
+                                        <p:tgtEl>
+                                          <p:spTgt spid="3">
+                                            <p:txEl>
+                                              <p:pRg st="0" end="0"/>
+                                            </p:txEl>
+                                          </p:spTgt>
+                                        </p:tgtEl>
+                                      </p:cBhvr>
+                                      <p:to x="100000" y="100000"/>
+                                    </p:animScale>
+                                    <p:animScale>
+                                      <p:cBhvr>
+                                        <p:cTn id="35" dur="26">
+                                          <p:stCondLst>
+                                            <p:cond delay="1808"/>
+                                          </p:stCondLst>
+                                        </p:cTn>
+                                        <p:tgtEl>
+                                          <p:spTgt spid="3">
+                                            <p:txEl>
+                                              <p:pRg st="0" end="0"/>
+                                            </p:txEl>
+                                          </p:spTgt>
+                                        </p:tgtEl>
+                                      </p:cBhvr>
+                                      <p:to x="100000" y="95000"/>
+                                    </p:animScale>
+                                    <p:animScale>
+                                      <p:cBhvr>
+                                        <p:cTn id="36" dur="166" decel="50000">
+                                          <p:stCondLst>
+                                            <p:cond delay="1834"/>
+                                          </p:stCondLst>
+                                        </p:cTn>
+                                        <p:tgtEl>
+                                          <p:spTgt spid="3">
+                                            <p:txEl>
+                                              <p:pRg st="0" end="0"/>
+                                            </p:txEl>
+                                          </p:spTgt>
+                                        </p:tgtEl>
+                                      </p:cBhvr>
+                                      <p:to x="100000" y="100000"/>
+                                    </p:animScale>
+                                  </p:childTnLst>
+                                </p:cTn>
+                              </p:par>
+                              <p:par>
+                                <p:cTn id="37" presetID="26" presetClass="entr" presetSubtype="0" fill="hold" nodeType="withEffect">
+                                  <p:stCondLst>
+                                    <p:cond delay="0"/>
+                                  </p:stCondLst>
+                                  <p:childTnLst>
+                                    <p:set>
+                                      <p:cBhvr>
+                                        <p:cTn id="38" dur="1" fill="hold">
+                                          <p:stCondLst>
+                                            <p:cond delay="0"/>
+                                          </p:stCondLst>
+                                        </p:cTn>
+                                        <p:tgtEl>
+                                          <p:spTgt spid="4"/>
+                                        </p:tgtEl>
+                                        <p:attrNameLst>
+                                          <p:attrName>style.visibility</p:attrName>
+                                        </p:attrNameLst>
+                                      </p:cBhvr>
+                                      <p:to>
+                                        <p:strVal val="visible"/>
+                                      </p:to>
+                                    </p:set>
+                                    <p:animEffect transition="in" filter="wipe(down)">
+                                      <p:cBhvr>
+                                        <p:cTn id="39" dur="580">
+                                          <p:stCondLst>
+                                            <p:cond delay="0"/>
+                                          </p:stCondLst>
+                                        </p:cTn>
+                                        <p:tgtEl>
+                                          <p:spTgt spid="4"/>
+                                        </p:tgtEl>
+                                      </p:cBhvr>
+                                    </p:animEffect>
+                                    <p:anim calcmode="lin" valueType="num">
+                                      <p:cBhvr>
+                                        <p:cTn id="40" dur="1822" tmFilter="0,0; 0.14,0.36; 0.43,0.73; 0.71,0.91; 1.0,1.0">
+                                          <p:stCondLst>
+                                            <p:cond delay="0"/>
+                                          </p:stCondLst>
+                                        </p:cTn>
+                                        <p:tgtEl>
+                                          <p:spTgt spid="4"/>
+                                        </p:tgtEl>
+                                        <p:attrNameLst>
+                                          <p:attrName>ppt_x</p:attrName>
+                                        </p:attrNameLst>
+                                      </p:cBhvr>
+                                      <p:tavLst>
+                                        <p:tav tm="0">
+                                          <p:val>
+                                            <p:strVal val="#ppt_x-0.25"/>
+                                          </p:val>
+                                        </p:tav>
+                                        <p:tav tm="100000">
+                                          <p:val>
+                                            <p:strVal val="#ppt_x"/>
+                                          </p:val>
+                                        </p:tav>
+                                      </p:tavLst>
+                                    </p:anim>
+                                    <p:anim calcmode="lin" valueType="num">
+                                      <p:cBhvr>
+                                        <p:cTn id="41" dur="664" tmFilter="0.0,0.0; 0.25,0.07; 0.50,0.2; 0.75,0.467; 1.0,1.0">
+                                          <p:stCondLst>
+                                            <p:cond delay="0"/>
+                                          </p:stCondLst>
+                                        </p:cTn>
+                                        <p:tgtEl>
+                                          <p:spTgt spid="4"/>
+                                        </p:tgtEl>
+                                        <p:attrNameLst>
+                                          <p:attrName>ppt_y</p:attrName>
+                                        </p:attrNameLst>
+                                      </p:cBhvr>
+                                      <p:tavLst>
+                                        <p:tav tm="0" fmla="#ppt_y-sin(pi*$)/3">
+                                          <p:val>
+                                            <p:fltVal val="0.5"/>
+                                          </p:val>
+                                        </p:tav>
+                                        <p:tav tm="100000">
+                                          <p:val>
+                                            <p:fltVal val="1"/>
+                                          </p:val>
+                                        </p:tav>
+                                      </p:tavLst>
+                                    </p:anim>
+                                    <p:anim calcmode="lin" valueType="num">
+                                      <p:cBhvr>
+                                        <p:cTn id="42" dur="664" tmFilter="0, 0; 0.125,0.2665; 0.25,0.4; 0.375,0.465; 0.5,0.5;  0.625,0.535; 0.75,0.6; 0.875,0.7335; 1,1">
+                                          <p:stCondLst>
+                                            <p:cond delay="664"/>
+                                          </p:stCondLst>
+                                        </p:cTn>
+                                        <p:tgtEl>
+                                          <p:spTgt spid="4"/>
+                                        </p:tgtEl>
+                                        <p:attrNameLst>
+                                          <p:attrName>ppt_y</p:attrName>
+                                        </p:attrNameLst>
+                                      </p:cBhvr>
+                                      <p:tavLst>
+                                        <p:tav tm="0" fmla="#ppt_y-sin(pi*$)/9">
+                                          <p:val>
+                                            <p:fltVal val="0"/>
+                                          </p:val>
+                                        </p:tav>
+                                        <p:tav tm="100000">
+                                          <p:val>
+                                            <p:fltVal val="1"/>
+                                          </p:val>
+                                        </p:tav>
+                                      </p:tavLst>
+                                    </p:anim>
+                                    <p:anim calcmode="lin" valueType="num">
+                                      <p:cBhvr>
+                                        <p:cTn id="43" dur="332" tmFilter="0, 0; 0.125,0.2665; 0.25,0.4; 0.375,0.465; 0.5,0.5;  0.625,0.535; 0.75,0.6; 0.875,0.7335; 1,1">
+                                          <p:stCondLst>
+                                            <p:cond delay="1324"/>
+                                          </p:stCondLst>
+                                        </p:cTn>
+                                        <p:tgtEl>
+                                          <p:spTgt spid="4"/>
+                                        </p:tgtEl>
+                                        <p:attrNameLst>
+                                          <p:attrName>ppt_y</p:attrName>
+                                        </p:attrNameLst>
+                                      </p:cBhvr>
+                                      <p:tavLst>
+                                        <p:tav tm="0" fmla="#ppt_y-sin(pi*$)/27">
+                                          <p:val>
+                                            <p:fltVal val="0"/>
+                                          </p:val>
+                                        </p:tav>
+                                        <p:tav tm="100000">
+                                          <p:val>
+                                            <p:fltVal val="1"/>
+                                          </p:val>
+                                        </p:tav>
+                                      </p:tavLst>
+                                    </p:anim>
+                                    <p:anim calcmode="lin" valueType="num">
+                                      <p:cBhvr>
+                                        <p:cTn id="44" dur="164" tmFilter="0, 0; 0.125,0.2665; 0.25,0.4; 0.375,0.465; 0.5,0.5;  0.625,0.535; 0.75,0.6; 0.875,0.7335; 1,1">
+                                          <p:stCondLst>
+                                            <p:cond delay="1656"/>
+                                          </p:stCondLst>
+                                        </p:cTn>
+                                        <p:tgtEl>
+                                          <p:spTgt spid="4"/>
+                                        </p:tgtEl>
+                                        <p:attrNameLst>
+                                          <p:attrName>ppt_y</p:attrName>
+                                        </p:attrNameLst>
+                                      </p:cBhvr>
+                                      <p:tavLst>
+                                        <p:tav tm="0" fmla="#ppt_y-sin(pi*$)/81">
+                                          <p:val>
+                                            <p:fltVal val="0"/>
+                                          </p:val>
+                                        </p:tav>
+                                        <p:tav tm="100000">
+                                          <p:val>
+                                            <p:fltVal val="1"/>
+                                          </p:val>
+                                        </p:tav>
+                                      </p:tavLst>
+                                    </p:anim>
+                                    <p:animScale>
+                                      <p:cBhvr>
+                                        <p:cTn id="45" dur="26">
+                                          <p:stCondLst>
+                                            <p:cond delay="650"/>
+                                          </p:stCondLst>
+                                        </p:cTn>
+                                        <p:tgtEl>
+                                          <p:spTgt spid="4"/>
+                                        </p:tgtEl>
+                                      </p:cBhvr>
+                                      <p:to x="100000" y="60000"/>
+                                    </p:animScale>
+                                    <p:animScale>
+                                      <p:cBhvr>
+                                        <p:cTn id="46" dur="166" decel="50000">
+                                          <p:stCondLst>
+                                            <p:cond delay="676"/>
+                                          </p:stCondLst>
+                                        </p:cTn>
+                                        <p:tgtEl>
+                                          <p:spTgt spid="4"/>
+                                        </p:tgtEl>
+                                      </p:cBhvr>
+                                      <p:to x="100000" y="100000"/>
+                                    </p:animScale>
+                                    <p:animScale>
+                                      <p:cBhvr>
+                                        <p:cTn id="47" dur="26">
+                                          <p:stCondLst>
+                                            <p:cond delay="1312"/>
+                                          </p:stCondLst>
+                                        </p:cTn>
+                                        <p:tgtEl>
+                                          <p:spTgt spid="4"/>
+                                        </p:tgtEl>
+                                      </p:cBhvr>
+                                      <p:to x="100000" y="80000"/>
+                                    </p:animScale>
+                                    <p:animScale>
+                                      <p:cBhvr>
+                                        <p:cTn id="48" dur="166" decel="50000">
+                                          <p:stCondLst>
+                                            <p:cond delay="1338"/>
+                                          </p:stCondLst>
+                                        </p:cTn>
+                                        <p:tgtEl>
+                                          <p:spTgt spid="4"/>
+                                        </p:tgtEl>
+                                      </p:cBhvr>
+                                      <p:to x="100000" y="100000"/>
+                                    </p:animScale>
+                                    <p:animScale>
+                                      <p:cBhvr>
+                                        <p:cTn id="49" dur="26">
+                                          <p:stCondLst>
+                                            <p:cond delay="1642"/>
+                                          </p:stCondLst>
+                                        </p:cTn>
+                                        <p:tgtEl>
+                                          <p:spTgt spid="4"/>
+                                        </p:tgtEl>
+                                      </p:cBhvr>
+                                      <p:to x="100000" y="90000"/>
+                                    </p:animScale>
+                                    <p:animScale>
+                                      <p:cBhvr>
+                                        <p:cTn id="50" dur="166" decel="50000">
+                                          <p:stCondLst>
+                                            <p:cond delay="1668"/>
+                                          </p:stCondLst>
+                                        </p:cTn>
+                                        <p:tgtEl>
+                                          <p:spTgt spid="4"/>
+                                        </p:tgtEl>
+                                      </p:cBhvr>
+                                      <p:to x="100000" y="100000"/>
+                                    </p:animScale>
+                                    <p:animScale>
+                                      <p:cBhvr>
+                                        <p:cTn id="51" dur="26">
+                                          <p:stCondLst>
+                                            <p:cond delay="1808"/>
+                                          </p:stCondLst>
+                                        </p:cTn>
+                                        <p:tgtEl>
+                                          <p:spTgt spid="4"/>
+                                        </p:tgtEl>
+                                      </p:cBhvr>
+                                      <p:to x="100000" y="95000"/>
+                                    </p:animScale>
+                                    <p:animScale>
+                                      <p:cBhvr>
+                                        <p:cTn id="52" dur="166" decel="50000">
+                                          <p:stCondLst>
+                                            <p:cond delay="1834"/>
+                                          </p:stCondLst>
+                                        </p:cTn>
+                                        <p:tgtEl>
+                                          <p:spTgt spid="4"/>
+                                        </p:tgtEl>
+                                      </p:cBhvr>
+                                      <p:to x="100000" y="100000"/>
+                                    </p:animScale>
                                   </p:childTnLst>
                                 </p:cTn>
                               </p:par>
@@ -14527,7 +16585,6 @@
               <a:rPr lang="pt-BR" sz="2400" dirty="0"/>
               <a:t>Sequência de caracteres de tamanho variável. Máximo 2GB de dados de texto</a:t>
             </a:r>
-            <a:endParaRPr lang="pt-BR" sz="2400" dirty="0"/>
           </a:p>
         </p:txBody>
       </p:sp>
@@ -14923,7 +16980,6 @@
               <a:rPr lang="pt-BR" sz="2400" dirty="0"/>
               <a:t>Unicode de comprimento variável. Máximo 2GB de dados de texto</a:t>
             </a:r>
-            <a:endParaRPr lang="pt-BR" sz="2400" dirty="0"/>
           </a:p>
         </p:txBody>
       </p:sp>
@@ -15884,18 +17940,18 @@
 </file>
 
 <file path=customXml/item2.xml><?xml version="1.0" encoding="utf-8"?>
+<p:properties xmlns:p="http://schemas.microsoft.com/office/2006/metadata/properties" xmlns:xsi="http://www.w3.org/2001/XMLSchema-instance" xmlns:pc="http://schemas.microsoft.com/office/infopath/2007/PartnerControls">
+  <documentManagement/>
+</p:properties>
+</file>
+
+<file path=customXml/item3.xml><?xml version="1.0" encoding="utf-8"?>
 <?mso-contentType ?>
 <FormTemplates xmlns="http://schemas.microsoft.com/sharepoint/v3/contenttype/forms">
   <Display>DocumentLibraryForm</Display>
   <Edit>DocumentLibraryForm</Edit>
   <New>DocumentLibraryForm</New>
 </FormTemplates>
-</file>
-
-<file path=customXml/item3.xml><?xml version="1.0" encoding="utf-8"?>
-<p:properties xmlns:p="http://schemas.microsoft.com/office/2006/metadata/properties" xmlns:xsi="http://www.w3.org/2001/XMLSchema-instance" xmlns:pc="http://schemas.microsoft.com/office/infopath/2007/PartnerControls">
-  <documentManagement/>
-</p:properties>
 </file>
 
 <file path=customXml/itemProps1.xml><?xml version="1.0" encoding="utf-8"?>
@@ -15917,14 +17973,6 @@
 </file>
 
 <file path=customXml/itemProps2.xml><?xml version="1.0" encoding="utf-8"?>
-<ds:datastoreItem xmlns:ds="http://schemas.openxmlformats.org/officeDocument/2006/customXml" ds:itemID="{24D311B8-86CA-4BE9-AA91-15B62B78E4A1}">
-  <ds:schemaRefs>
-    <ds:schemaRef ds:uri="http://schemas.microsoft.com/sharepoint/v3/contenttype/forms"/>
-  </ds:schemaRefs>
-</ds:datastoreItem>
-</file>
-
-<file path=customXml/itemProps3.xml><?xml version="1.0" encoding="utf-8"?>
 <ds:datastoreItem xmlns:ds="http://schemas.openxmlformats.org/officeDocument/2006/customXml" ds:itemID="{F7CEDE1A-8B31-47A8-B247-7C73C2A7DC45}">
   <ds:schemaRefs>
     <ds:schemaRef ds:uri="http://purl.org/dc/terms/"/>
@@ -15938,4 +17986,12 @@
     <ds:schemaRef ds:uri="http://www.w3.org/XML/1998/namespace"/>
   </ds:schemaRefs>
 </ds:datastoreItem>
+</file>
+
+<file path=customXml/itemProps3.xml><?xml version="1.0" encoding="utf-8"?>
+<ds:datastoreItem xmlns:ds="http://schemas.openxmlformats.org/officeDocument/2006/customXml" ds:itemID="{24D311B8-86CA-4BE9-AA91-15B62B78E4A1}">
+  <ds:schemaRefs>
+    <ds:schemaRef ds:uri="http://schemas.microsoft.com/sharepoint/v3/contenttype/forms"/>
+  </ds:schemaRefs>
+</ds:datastoreItem>
 </file>
</xml_diff>